<commit_message>
corretto ROE, abbellimento, aggiunt di ROD e ROT
</commit_message>
<xml_diff>
--- a/bozza_andamento.pptx
+++ b/bozza_andamento.pptx
@@ -12,7 +12,7 @@
 </p:presentation>
 </file>
 
-<file path=ppt/charts/chart2.xml><?xml version="1.0" encoding="utf-8"?>
+<file path=ppt/charts/chart7.xml><?xml version="1.0" encoding="utf-8"?>
 <c:chartSpace xmlns:c="http://schemas.openxmlformats.org/drawingml/2006/chart" xmlns:a="http://schemas.openxmlformats.org/drawingml/2006/main" xmlns:r="http://schemas.openxmlformats.org/officeDocument/2006/relationships">
   <c:lang val="en-US"/>
   <c:roundedCorners val="0"/>
@@ -26,8 +26,8 @@
           <c:yMode val="edge"/>
           <c:x val="0"/>
           <c:y val="0.0614549883733806"/>
-          <c:w val="0.782993197278912"/>
-          <c:h val="0.865906322666371"/>
+          <c:w val="0.782901201904906"/>
+          <c:h val="0.865795592957591"/>
         </c:manualLayout>
       </c:layout>
       <c:barChart>
@@ -125,11 +125,11 @@
         </c:ser>
         <c:gapWidth val="100"/>
         <c:overlap val="0"/>
-        <c:axId val="9758146"/>
-        <c:axId val="229740"/>
+        <c:axId val="33045791"/>
+        <c:axId val="1452723"/>
       </c:barChart>
       <c:catAx>
-        <c:axId val="9758146"/>
+        <c:axId val="33045791"/>
         <c:scaling>
           <c:orientation val="minMax"/>
         </c:scaling>
@@ -161,7 +161,7 @@
             </a:pPr>
           </a:p>
         </c:txPr>
-        <c:crossAx val="229740"/>
+        <c:crossAx val="1452723"/>
         <c:crosses val="autoZero"/>
         <c:auto val="1"/>
         <c:lblAlgn val="ctr"/>
@@ -169,7 +169,7 @@
         <c:noMultiLvlLbl val="0"/>
       </c:catAx>
       <c:valAx>
-        <c:axId val="229740"/>
+        <c:axId val="1452723"/>
         <c:scaling>
           <c:orientation val="minMax"/>
         </c:scaling>
@@ -210,7 +210,7 @@
             </a:pPr>
           </a:p>
         </c:txPr>
-        <c:crossAx val="9758146"/>
+        <c:crossAx val="33045791"/>
         <c:crosses val="autoZero"/>
         <c:crossBetween val="between"/>
       </c:valAx>
@@ -301,7 +301,7 @@
       </p:grpSpPr>
       <p:sp>
         <p:nvSpPr>
-          <p:cNvPr id="22" name="PlaceHolder 1"/>
+          <p:cNvPr id="23" name="PlaceHolder 1"/>
           <p:cNvSpPr>
             <a:spLocks noGrp="1"/>
           </p:cNvSpPr>
@@ -312,7 +312,7 @@
         <p:spPr>
           <a:xfrm>
             <a:off x="504000" y="226080"/>
-            <a:ext cx="9071280" cy="946080"/>
+            <a:ext cx="9070920" cy="945720"/>
           </a:xfrm>
           <a:prstGeom prst="rect">
             <a:avLst/>
@@ -336,7 +336,7 @@
       </p:sp>
       <p:sp>
         <p:nvSpPr>
-          <p:cNvPr id="23" name="PlaceHolder 2"/>
+          <p:cNvPr id="24" name="PlaceHolder 2"/>
           <p:cNvSpPr>
             <a:spLocks noGrp="1"/>
           </p:cNvSpPr>
@@ -347,7 +347,7 @@
         <p:spPr>
           <a:xfrm>
             <a:off x="504000" y="1326600"/>
-            <a:ext cx="9072000" cy="1568520"/>
+            <a:ext cx="9071640" cy="1568160"/>
           </a:xfrm>
           <a:prstGeom prst="rect">
             <a:avLst/>
@@ -370,7 +370,7 @@
       </p:sp>
       <p:sp>
         <p:nvSpPr>
-          <p:cNvPr id="24" name="PlaceHolder 3"/>
+          <p:cNvPr id="25" name="PlaceHolder 3"/>
           <p:cNvSpPr>
             <a:spLocks noGrp="1"/>
           </p:cNvSpPr>
@@ -380,8 +380,8 @@
         </p:nvSpPr>
         <p:spPr>
           <a:xfrm>
-            <a:off x="504000" y="3044520"/>
-            <a:ext cx="9072000" cy="1568520"/>
+            <a:off x="504000" y="3044160"/>
+            <a:ext cx="9071640" cy="1568160"/>
           </a:xfrm>
           <a:prstGeom prst="rect">
             <a:avLst/>
@@ -426,7 +426,7 @@
       </p:grpSpPr>
       <p:sp>
         <p:nvSpPr>
-          <p:cNvPr id="25" name="PlaceHolder 1"/>
+          <p:cNvPr id="26" name="PlaceHolder 1"/>
           <p:cNvSpPr>
             <a:spLocks noGrp="1"/>
           </p:cNvSpPr>
@@ -437,7 +437,7 @@
         <p:spPr>
           <a:xfrm>
             <a:off x="504000" y="226080"/>
-            <a:ext cx="9071280" cy="946080"/>
+            <a:ext cx="9070920" cy="945720"/>
           </a:xfrm>
           <a:prstGeom prst="rect">
             <a:avLst/>
@@ -461,7 +461,7 @@
       </p:sp>
       <p:sp>
         <p:nvSpPr>
-          <p:cNvPr id="26" name="PlaceHolder 2"/>
+          <p:cNvPr id="27" name="PlaceHolder 2"/>
           <p:cNvSpPr>
             <a:spLocks noGrp="1"/>
           </p:cNvSpPr>
@@ -472,7 +472,7 @@
         <p:spPr>
           <a:xfrm>
             <a:off x="504000" y="1326600"/>
-            <a:ext cx="4426920" cy="1568520"/>
+            <a:ext cx="4426920" cy="1568160"/>
           </a:xfrm>
           <a:prstGeom prst="rect">
             <a:avLst/>
@@ -495,7 +495,7 @@
       </p:sp>
       <p:sp>
         <p:nvSpPr>
-          <p:cNvPr id="27" name="PlaceHolder 3"/>
+          <p:cNvPr id="28" name="PlaceHolder 3"/>
           <p:cNvSpPr>
             <a:spLocks noGrp="1"/>
           </p:cNvSpPr>
@@ -506,7 +506,7 @@
         <p:spPr>
           <a:xfrm>
             <a:off x="5152680" y="1326600"/>
-            <a:ext cx="4426920" cy="1568520"/>
+            <a:ext cx="4426920" cy="1568160"/>
           </a:xfrm>
           <a:prstGeom prst="rect">
             <a:avLst/>
@@ -529,7 +529,7 @@
       </p:sp>
       <p:sp>
         <p:nvSpPr>
-          <p:cNvPr id="28" name="PlaceHolder 4"/>
+          <p:cNvPr id="29" name="PlaceHolder 4"/>
           <p:cNvSpPr>
             <a:spLocks noGrp="1"/>
           </p:cNvSpPr>
@@ -539,8 +539,8 @@
         </p:nvSpPr>
         <p:spPr>
           <a:xfrm>
-            <a:off x="504000" y="3044520"/>
-            <a:ext cx="4426920" cy="1568520"/>
+            <a:off x="504000" y="3044160"/>
+            <a:ext cx="4426920" cy="1568160"/>
           </a:xfrm>
           <a:prstGeom prst="rect">
             <a:avLst/>
@@ -563,7 +563,7 @@
       </p:sp>
       <p:sp>
         <p:nvSpPr>
-          <p:cNvPr id="29" name="PlaceHolder 5"/>
+          <p:cNvPr id="30" name="PlaceHolder 5"/>
           <p:cNvSpPr>
             <a:spLocks noGrp="1"/>
           </p:cNvSpPr>
@@ -573,8 +573,8 @@
         </p:nvSpPr>
         <p:spPr>
           <a:xfrm>
-            <a:off x="5152680" y="3044520"/>
-            <a:ext cx="4426920" cy="1568520"/>
+            <a:off x="5152680" y="3044160"/>
+            <a:ext cx="4426920" cy="1568160"/>
           </a:xfrm>
           <a:prstGeom prst="rect">
             <a:avLst/>
@@ -619,7 +619,7 @@
       </p:grpSpPr>
       <p:sp>
         <p:nvSpPr>
-          <p:cNvPr id="30" name="PlaceHolder 1"/>
+          <p:cNvPr id="31" name="PlaceHolder 1"/>
           <p:cNvSpPr>
             <a:spLocks noGrp="1"/>
           </p:cNvSpPr>
@@ -630,7 +630,7 @@
         <p:spPr>
           <a:xfrm>
             <a:off x="504000" y="226080"/>
-            <a:ext cx="9071280" cy="946080"/>
+            <a:ext cx="9070920" cy="945720"/>
           </a:xfrm>
           <a:prstGeom prst="rect">
             <a:avLst/>
@@ -654,7 +654,7 @@
       </p:sp>
       <p:sp>
         <p:nvSpPr>
-          <p:cNvPr id="31" name="PlaceHolder 2"/>
+          <p:cNvPr id="32" name="PlaceHolder 2"/>
           <p:cNvSpPr>
             <a:spLocks noGrp="1"/>
           </p:cNvSpPr>
@@ -665,7 +665,7 @@
         <p:spPr>
           <a:xfrm>
             <a:off x="504000" y="1326600"/>
-            <a:ext cx="2921040" cy="1568520"/>
+            <a:ext cx="2920680" cy="1568160"/>
           </a:xfrm>
           <a:prstGeom prst="rect">
             <a:avLst/>
@@ -688,7 +688,7 @@
       </p:sp>
       <p:sp>
         <p:nvSpPr>
-          <p:cNvPr id="32" name="PlaceHolder 3"/>
+          <p:cNvPr id="33" name="PlaceHolder 3"/>
           <p:cNvSpPr>
             <a:spLocks noGrp="1"/>
           </p:cNvSpPr>
@@ -698,8 +698,8 @@
         </p:nvSpPr>
         <p:spPr>
           <a:xfrm>
-            <a:off x="3571560" y="1326600"/>
-            <a:ext cx="2921040" cy="1568520"/>
+            <a:off x="3571200" y="1326600"/>
+            <a:ext cx="2920680" cy="1568160"/>
           </a:xfrm>
           <a:prstGeom prst="rect">
             <a:avLst/>
@@ -722,7 +722,7 @@
       </p:sp>
       <p:sp>
         <p:nvSpPr>
-          <p:cNvPr id="33" name="PlaceHolder 4"/>
+          <p:cNvPr id="34" name="PlaceHolder 4"/>
           <p:cNvSpPr>
             <a:spLocks noGrp="1"/>
           </p:cNvSpPr>
@@ -732,8 +732,8 @@
         </p:nvSpPr>
         <p:spPr>
           <a:xfrm>
-            <a:off x="6639120" y="1326600"/>
-            <a:ext cx="2921040" cy="1568520"/>
+            <a:off x="6638040" y="1326600"/>
+            <a:ext cx="2920680" cy="1568160"/>
           </a:xfrm>
           <a:prstGeom prst="rect">
             <a:avLst/>
@@ -756,7 +756,7 @@
       </p:sp>
       <p:sp>
         <p:nvSpPr>
-          <p:cNvPr id="34" name="PlaceHolder 5"/>
+          <p:cNvPr id="35" name="PlaceHolder 5"/>
           <p:cNvSpPr>
             <a:spLocks noGrp="1"/>
           </p:cNvSpPr>
@@ -766,8 +766,8 @@
         </p:nvSpPr>
         <p:spPr>
           <a:xfrm>
-            <a:off x="504000" y="3044520"/>
-            <a:ext cx="2921040" cy="1568520"/>
+            <a:off x="504000" y="3044160"/>
+            <a:ext cx="2920680" cy="1568160"/>
           </a:xfrm>
           <a:prstGeom prst="rect">
             <a:avLst/>
@@ -790,7 +790,7 @@
       </p:sp>
       <p:sp>
         <p:nvSpPr>
-          <p:cNvPr id="35" name="PlaceHolder 6"/>
+          <p:cNvPr id="36" name="PlaceHolder 6"/>
           <p:cNvSpPr>
             <a:spLocks noGrp="1"/>
           </p:cNvSpPr>
@@ -800,8 +800,8 @@
         </p:nvSpPr>
         <p:spPr>
           <a:xfrm>
-            <a:off x="3571560" y="3044520"/>
-            <a:ext cx="2921040" cy="1568520"/>
+            <a:off x="3571200" y="3044160"/>
+            <a:ext cx="2920680" cy="1568160"/>
           </a:xfrm>
           <a:prstGeom prst="rect">
             <a:avLst/>
@@ -824,7 +824,7 @@
       </p:sp>
       <p:sp>
         <p:nvSpPr>
-          <p:cNvPr id="36" name="PlaceHolder 7"/>
+          <p:cNvPr id="37" name="PlaceHolder 7"/>
           <p:cNvSpPr>
             <a:spLocks noGrp="1"/>
           </p:cNvSpPr>
@@ -834,8 +834,8 @@
         </p:nvSpPr>
         <p:spPr>
           <a:xfrm>
-            <a:off x="6639120" y="3044520"/>
-            <a:ext cx="2921040" cy="1568520"/>
+            <a:off x="6638040" y="3044160"/>
+            <a:ext cx="2920680" cy="1568160"/>
           </a:xfrm>
           <a:prstGeom prst="rect">
             <a:avLst/>
@@ -880,7 +880,7 @@
       </p:grpSpPr>
       <p:sp>
         <p:nvSpPr>
-          <p:cNvPr id="1" name="PlaceHolder 1"/>
+          <p:cNvPr id="2" name="PlaceHolder 1"/>
           <p:cNvSpPr>
             <a:spLocks noGrp="1"/>
           </p:cNvSpPr>
@@ -891,7 +891,7 @@
         <p:spPr>
           <a:xfrm>
             <a:off x="504000" y="226080"/>
-            <a:ext cx="9071280" cy="946080"/>
+            <a:ext cx="9070920" cy="945720"/>
           </a:xfrm>
           <a:prstGeom prst="rect">
             <a:avLst/>
@@ -915,7 +915,7 @@
       </p:sp>
       <p:sp>
         <p:nvSpPr>
-          <p:cNvPr id="2" name="PlaceHolder 2"/>
+          <p:cNvPr id="3" name="PlaceHolder 2"/>
           <p:cNvSpPr>
             <a:spLocks noGrp="1"/>
           </p:cNvSpPr>
@@ -926,7 +926,7 @@
         <p:spPr>
           <a:xfrm>
             <a:off x="504000" y="1326600"/>
-            <a:ext cx="9072000" cy="3288600"/>
+            <a:ext cx="9071640" cy="3288240"/>
           </a:xfrm>
           <a:prstGeom prst="rect">
             <a:avLst/>
@@ -972,7 +972,7 @@
       </p:grpSpPr>
       <p:sp>
         <p:nvSpPr>
-          <p:cNvPr id="3" name="PlaceHolder 1"/>
+          <p:cNvPr id="4" name="PlaceHolder 1"/>
           <p:cNvSpPr>
             <a:spLocks noGrp="1"/>
           </p:cNvSpPr>
@@ -983,7 +983,7 @@
         <p:spPr>
           <a:xfrm>
             <a:off x="504000" y="226080"/>
-            <a:ext cx="9071280" cy="946080"/>
+            <a:ext cx="9070920" cy="945720"/>
           </a:xfrm>
           <a:prstGeom prst="rect">
             <a:avLst/>
@@ -1007,7 +1007,7 @@
       </p:sp>
       <p:sp>
         <p:nvSpPr>
-          <p:cNvPr id="4" name="PlaceHolder 2"/>
+          <p:cNvPr id="5" name="PlaceHolder 2"/>
           <p:cNvSpPr>
             <a:spLocks noGrp="1"/>
           </p:cNvSpPr>
@@ -1018,7 +1018,7 @@
         <p:spPr>
           <a:xfrm>
             <a:off x="504000" y="1326600"/>
-            <a:ext cx="9072000" cy="3288600"/>
+            <a:ext cx="9071640" cy="3288240"/>
           </a:xfrm>
           <a:prstGeom prst="rect">
             <a:avLst/>
@@ -1063,7 +1063,7 @@
       </p:grpSpPr>
       <p:sp>
         <p:nvSpPr>
-          <p:cNvPr id="5" name="PlaceHolder 1"/>
+          <p:cNvPr id="6" name="PlaceHolder 1"/>
           <p:cNvSpPr>
             <a:spLocks noGrp="1"/>
           </p:cNvSpPr>
@@ -1074,7 +1074,7 @@
         <p:spPr>
           <a:xfrm>
             <a:off x="504000" y="226080"/>
-            <a:ext cx="9071280" cy="946080"/>
+            <a:ext cx="9070920" cy="945720"/>
           </a:xfrm>
           <a:prstGeom prst="rect">
             <a:avLst/>
@@ -1098,7 +1098,7 @@
       </p:sp>
       <p:sp>
         <p:nvSpPr>
-          <p:cNvPr id="6" name="PlaceHolder 2"/>
+          <p:cNvPr id="7" name="PlaceHolder 2"/>
           <p:cNvSpPr>
             <a:spLocks noGrp="1"/>
           </p:cNvSpPr>
@@ -1109,7 +1109,7 @@
         <p:spPr>
           <a:xfrm>
             <a:off x="504000" y="1326600"/>
-            <a:ext cx="4426920" cy="3288600"/>
+            <a:ext cx="4426920" cy="3288240"/>
           </a:xfrm>
           <a:prstGeom prst="rect">
             <a:avLst/>
@@ -1132,7 +1132,7 @@
       </p:sp>
       <p:sp>
         <p:nvSpPr>
-          <p:cNvPr id="7" name="PlaceHolder 3"/>
+          <p:cNvPr id="8" name="PlaceHolder 3"/>
           <p:cNvSpPr>
             <a:spLocks noGrp="1"/>
           </p:cNvSpPr>
@@ -1143,7 +1143,7 @@
         <p:spPr>
           <a:xfrm>
             <a:off x="5152680" y="1326600"/>
-            <a:ext cx="4426920" cy="3288600"/>
+            <a:ext cx="4426920" cy="3288240"/>
           </a:xfrm>
           <a:prstGeom prst="rect">
             <a:avLst/>
@@ -1188,7 +1188,7 @@
       </p:grpSpPr>
       <p:sp>
         <p:nvSpPr>
-          <p:cNvPr id="8" name="PlaceHolder 1"/>
+          <p:cNvPr id="9" name="PlaceHolder 1"/>
           <p:cNvSpPr>
             <a:spLocks noGrp="1"/>
           </p:cNvSpPr>
@@ -1199,7 +1199,7 @@
         <p:spPr>
           <a:xfrm>
             <a:off x="504000" y="226080"/>
-            <a:ext cx="9071280" cy="946080"/>
+            <a:ext cx="9070920" cy="945720"/>
           </a:xfrm>
           <a:prstGeom prst="rect">
             <a:avLst/>
@@ -1245,7 +1245,7 @@
       </p:grpSpPr>
       <p:sp>
         <p:nvSpPr>
-          <p:cNvPr id="9" name="PlaceHolder 1"/>
+          <p:cNvPr id="10" name="PlaceHolder 1"/>
           <p:cNvSpPr>
             <a:spLocks noGrp="1"/>
           </p:cNvSpPr>
@@ -1256,7 +1256,7 @@
         <p:spPr>
           <a:xfrm>
             <a:off x="504000" y="226080"/>
-            <a:ext cx="9071280" cy="4386600"/>
+            <a:ext cx="9070920" cy="4385160"/>
           </a:xfrm>
           <a:prstGeom prst="rect">
             <a:avLst/>
@@ -1302,7 +1302,7 @@
       </p:grpSpPr>
       <p:sp>
         <p:nvSpPr>
-          <p:cNvPr id="10" name="PlaceHolder 1"/>
+          <p:cNvPr id="11" name="PlaceHolder 1"/>
           <p:cNvSpPr>
             <a:spLocks noGrp="1"/>
           </p:cNvSpPr>
@@ -1313,7 +1313,7 @@
         <p:spPr>
           <a:xfrm>
             <a:off x="504000" y="226080"/>
-            <a:ext cx="9071280" cy="946080"/>
+            <a:ext cx="9070920" cy="945720"/>
           </a:xfrm>
           <a:prstGeom prst="rect">
             <a:avLst/>
@@ -1337,7 +1337,7 @@
       </p:sp>
       <p:sp>
         <p:nvSpPr>
-          <p:cNvPr id="11" name="PlaceHolder 2"/>
+          <p:cNvPr id="12" name="PlaceHolder 2"/>
           <p:cNvSpPr>
             <a:spLocks noGrp="1"/>
           </p:cNvSpPr>
@@ -1348,7 +1348,7 @@
         <p:spPr>
           <a:xfrm>
             <a:off x="504000" y="1326600"/>
-            <a:ext cx="4426920" cy="1568520"/>
+            <a:ext cx="4426920" cy="1568160"/>
           </a:xfrm>
           <a:prstGeom prst="rect">
             <a:avLst/>
@@ -1371,7 +1371,7 @@
       </p:sp>
       <p:sp>
         <p:nvSpPr>
-          <p:cNvPr id="12" name="PlaceHolder 3"/>
+          <p:cNvPr id="13" name="PlaceHolder 3"/>
           <p:cNvSpPr>
             <a:spLocks noGrp="1"/>
           </p:cNvSpPr>
@@ -1382,7 +1382,7 @@
         <p:spPr>
           <a:xfrm>
             <a:off x="5152680" y="1326600"/>
-            <a:ext cx="4426920" cy="3288600"/>
+            <a:ext cx="4426920" cy="3288240"/>
           </a:xfrm>
           <a:prstGeom prst="rect">
             <a:avLst/>
@@ -1405,7 +1405,7 @@
       </p:sp>
       <p:sp>
         <p:nvSpPr>
-          <p:cNvPr id="13" name="PlaceHolder 4"/>
+          <p:cNvPr id="14" name="PlaceHolder 4"/>
           <p:cNvSpPr>
             <a:spLocks noGrp="1"/>
           </p:cNvSpPr>
@@ -1415,8 +1415,8 @@
         </p:nvSpPr>
         <p:spPr>
           <a:xfrm>
-            <a:off x="504000" y="3044520"/>
-            <a:ext cx="4426920" cy="1568520"/>
+            <a:off x="504000" y="3044160"/>
+            <a:ext cx="4426920" cy="1568160"/>
           </a:xfrm>
           <a:prstGeom prst="rect">
             <a:avLst/>
@@ -1461,7 +1461,7 @@
       </p:grpSpPr>
       <p:sp>
         <p:nvSpPr>
-          <p:cNvPr id="14" name="PlaceHolder 1"/>
+          <p:cNvPr id="15" name="PlaceHolder 1"/>
           <p:cNvSpPr>
             <a:spLocks noGrp="1"/>
           </p:cNvSpPr>
@@ -1472,7 +1472,7 @@
         <p:spPr>
           <a:xfrm>
             <a:off x="504000" y="226080"/>
-            <a:ext cx="9071280" cy="946080"/>
+            <a:ext cx="9070920" cy="945720"/>
           </a:xfrm>
           <a:prstGeom prst="rect">
             <a:avLst/>
@@ -1496,7 +1496,7 @@
       </p:sp>
       <p:sp>
         <p:nvSpPr>
-          <p:cNvPr id="15" name="PlaceHolder 2"/>
+          <p:cNvPr id="16" name="PlaceHolder 2"/>
           <p:cNvSpPr>
             <a:spLocks noGrp="1"/>
           </p:cNvSpPr>
@@ -1507,7 +1507,7 @@
         <p:spPr>
           <a:xfrm>
             <a:off x="504000" y="1326600"/>
-            <a:ext cx="4426920" cy="3288600"/>
+            <a:ext cx="4426920" cy="3288240"/>
           </a:xfrm>
           <a:prstGeom prst="rect">
             <a:avLst/>
@@ -1530,7 +1530,7 @@
       </p:sp>
       <p:sp>
         <p:nvSpPr>
-          <p:cNvPr id="16" name="PlaceHolder 3"/>
+          <p:cNvPr id="17" name="PlaceHolder 3"/>
           <p:cNvSpPr>
             <a:spLocks noGrp="1"/>
           </p:cNvSpPr>
@@ -1541,7 +1541,7 @@
         <p:spPr>
           <a:xfrm>
             <a:off x="5152680" y="1326600"/>
-            <a:ext cx="4426920" cy="1568520"/>
+            <a:ext cx="4426920" cy="1568160"/>
           </a:xfrm>
           <a:prstGeom prst="rect">
             <a:avLst/>
@@ -1564,7 +1564,7 @@
       </p:sp>
       <p:sp>
         <p:nvSpPr>
-          <p:cNvPr id="17" name="PlaceHolder 4"/>
+          <p:cNvPr id="18" name="PlaceHolder 4"/>
           <p:cNvSpPr>
             <a:spLocks noGrp="1"/>
           </p:cNvSpPr>
@@ -1574,8 +1574,8 @@
         </p:nvSpPr>
         <p:spPr>
           <a:xfrm>
-            <a:off x="5152680" y="3044520"/>
-            <a:ext cx="4426920" cy="1568520"/>
+            <a:off x="5152680" y="3044160"/>
+            <a:ext cx="4426920" cy="1568160"/>
           </a:xfrm>
           <a:prstGeom prst="rect">
             <a:avLst/>
@@ -1620,7 +1620,7 @@
       </p:grpSpPr>
       <p:sp>
         <p:nvSpPr>
-          <p:cNvPr id="18" name="PlaceHolder 1"/>
+          <p:cNvPr id="19" name="PlaceHolder 1"/>
           <p:cNvSpPr>
             <a:spLocks noGrp="1"/>
           </p:cNvSpPr>
@@ -1631,7 +1631,7 @@
         <p:spPr>
           <a:xfrm>
             <a:off x="504000" y="226080"/>
-            <a:ext cx="9071280" cy="946080"/>
+            <a:ext cx="9070920" cy="945720"/>
           </a:xfrm>
           <a:prstGeom prst="rect">
             <a:avLst/>
@@ -1655,7 +1655,7 @@
       </p:sp>
       <p:sp>
         <p:nvSpPr>
-          <p:cNvPr id="19" name="PlaceHolder 2"/>
+          <p:cNvPr id="20" name="PlaceHolder 2"/>
           <p:cNvSpPr>
             <a:spLocks noGrp="1"/>
           </p:cNvSpPr>
@@ -1666,7 +1666,7 @@
         <p:spPr>
           <a:xfrm>
             <a:off x="504000" y="1326600"/>
-            <a:ext cx="4426920" cy="1568520"/>
+            <a:ext cx="4426920" cy="1568160"/>
           </a:xfrm>
           <a:prstGeom prst="rect">
             <a:avLst/>
@@ -1689,7 +1689,7 @@
       </p:sp>
       <p:sp>
         <p:nvSpPr>
-          <p:cNvPr id="20" name="PlaceHolder 3"/>
+          <p:cNvPr id="21" name="PlaceHolder 3"/>
           <p:cNvSpPr>
             <a:spLocks noGrp="1"/>
           </p:cNvSpPr>
@@ -1700,7 +1700,7 @@
         <p:spPr>
           <a:xfrm>
             <a:off x="5152680" y="1326600"/>
-            <a:ext cx="4426920" cy="1568520"/>
+            <a:ext cx="4426920" cy="1568160"/>
           </a:xfrm>
           <a:prstGeom prst="rect">
             <a:avLst/>
@@ -1723,7 +1723,7 @@
       </p:sp>
       <p:sp>
         <p:nvSpPr>
-          <p:cNvPr id="21" name="PlaceHolder 4"/>
+          <p:cNvPr id="22" name="PlaceHolder 4"/>
           <p:cNvSpPr>
             <a:spLocks noGrp="1"/>
           </p:cNvSpPr>
@@ -1733,8 +1733,8 @@
         </p:nvSpPr>
         <p:spPr>
           <a:xfrm>
-            <a:off x="504000" y="3044520"/>
-            <a:ext cx="9072000" cy="1568520"/>
+            <a:off x="504000" y="3044160"/>
+            <a:ext cx="9071640" cy="1568160"/>
           </a:xfrm>
           <a:prstGeom prst="rect">
             <a:avLst/>
@@ -1790,7 +1790,7 @@
         <p:spPr>
           <a:xfrm>
             <a:off x="504000" y="226080"/>
-            <a:ext cx="9071280" cy="946080"/>
+            <a:ext cx="9070920" cy="945720"/>
           </a:xfrm>
           <a:prstGeom prst="rect">
             <a:avLst/>
@@ -1810,6 +1810,189 @@
                 <a:latin typeface="Arial"/>
               </a:rPr>
               <a:t>Click to edit the title text format</a:t>
+            </a:r>
+            <a:endParaRPr b="0" lang="en-US" sz="1800" spc="-1" strike="noStrike">
+              <a:latin typeface="Arial"/>
+            </a:endParaRPr>
+          </a:p>
+        </p:txBody>
+      </p:sp>
+      <p:sp>
+        <p:nvSpPr>
+          <p:cNvPr id="1" name="PlaceHolder 2"/>
+          <p:cNvSpPr>
+            <a:spLocks noGrp="1"/>
+          </p:cNvSpPr>
+          <p:nvPr>
+            <p:ph type="body"/>
+          </p:nvPr>
+        </p:nvSpPr>
+        <p:spPr>
+          <a:xfrm>
+            <a:off x="504000" y="1326600"/>
+            <a:ext cx="9071640" cy="3288240"/>
+          </a:xfrm>
+          <a:prstGeom prst="rect">
+            <a:avLst/>
+          </a:prstGeom>
+          <a:noFill/>
+          <a:ln w="0">
+            <a:noFill/>
+          </a:ln>
+        </p:spPr>
+        <p:txBody>
+          <a:bodyPr lIns="0" rIns="0" tIns="0" bIns="0" anchor="t">
+            <a:normAutofit/>
+          </a:bodyPr>
+          <a:p>
+            <a:pPr marL="432000" indent="-324000">
+              <a:spcBef>
+                <a:spcPts val="1417"/>
+              </a:spcBef>
+              <a:buClr>
+                <a:srgbClr val="000000"/>
+              </a:buClr>
+              <a:buSzPct val="45000"/>
+              <a:buFont typeface="Wingdings" charset="2"/>
+              <a:buChar char=""/>
+            </a:pPr>
+            <a:r>
+              <a:rPr b="0" lang="en-US" sz="1800" spc="-1" strike="noStrike">
+                <a:latin typeface="Arial"/>
+              </a:rPr>
+              <a:t>Click to edit the outline text format</a:t>
+            </a:r>
+            <a:endParaRPr b="0" lang="en-US" sz="1800" spc="-1" strike="noStrike">
+              <a:latin typeface="Arial"/>
+            </a:endParaRPr>
+          </a:p>
+          <a:p>
+            <a:pPr lvl="1" marL="864000" indent="-324000">
+              <a:spcBef>
+                <a:spcPts val="1134"/>
+              </a:spcBef>
+              <a:buClr>
+                <a:srgbClr val="000000"/>
+              </a:buClr>
+              <a:buSzPct val="75000"/>
+              <a:buFont typeface="Symbol" charset="2"/>
+              <a:buChar char=""/>
+            </a:pPr>
+            <a:r>
+              <a:rPr b="0" lang="en-US" sz="1800" spc="-1" strike="noStrike">
+                <a:latin typeface="Arial"/>
+              </a:rPr>
+              <a:t>Second Outline Level</a:t>
+            </a:r>
+            <a:endParaRPr b="0" lang="en-US" sz="1800" spc="-1" strike="noStrike">
+              <a:latin typeface="Arial"/>
+            </a:endParaRPr>
+          </a:p>
+          <a:p>
+            <a:pPr lvl="2" marL="1296000" indent="-288000">
+              <a:spcBef>
+                <a:spcPts val="850"/>
+              </a:spcBef>
+              <a:buClr>
+                <a:srgbClr val="000000"/>
+              </a:buClr>
+              <a:buSzPct val="45000"/>
+              <a:buFont typeface="Wingdings" charset="2"/>
+              <a:buChar char=""/>
+            </a:pPr>
+            <a:r>
+              <a:rPr b="0" lang="en-US" sz="1800" spc="-1" strike="noStrike">
+                <a:latin typeface="Arial"/>
+              </a:rPr>
+              <a:t>Third Outline Level</a:t>
+            </a:r>
+            <a:endParaRPr b="0" lang="en-US" sz="1800" spc="-1" strike="noStrike">
+              <a:latin typeface="Arial"/>
+            </a:endParaRPr>
+          </a:p>
+          <a:p>
+            <a:pPr lvl="3" marL="1728000" indent="-216000">
+              <a:spcBef>
+                <a:spcPts val="567"/>
+              </a:spcBef>
+              <a:buClr>
+                <a:srgbClr val="000000"/>
+              </a:buClr>
+              <a:buSzPct val="75000"/>
+              <a:buFont typeface="Symbol" charset="2"/>
+              <a:buChar char=""/>
+            </a:pPr>
+            <a:r>
+              <a:rPr b="0" lang="en-US" sz="1800" spc="-1" strike="noStrike">
+                <a:latin typeface="Arial"/>
+              </a:rPr>
+              <a:t>Fourth Outline Level</a:t>
+            </a:r>
+            <a:endParaRPr b="0" lang="en-US" sz="1800" spc="-1" strike="noStrike">
+              <a:latin typeface="Arial"/>
+            </a:endParaRPr>
+          </a:p>
+          <a:p>
+            <a:pPr lvl="4" marL="2160000" indent="-216000">
+              <a:spcBef>
+                <a:spcPts val="283"/>
+              </a:spcBef>
+              <a:buClr>
+                <a:srgbClr val="000000"/>
+              </a:buClr>
+              <a:buSzPct val="45000"/>
+              <a:buFont typeface="Wingdings" charset="2"/>
+              <a:buChar char=""/>
+            </a:pPr>
+            <a:r>
+              <a:rPr b="0" lang="en-US" sz="1800" spc="-1" strike="noStrike">
+                <a:latin typeface="Arial"/>
+              </a:rPr>
+              <a:t>Fifth Outline Level</a:t>
+            </a:r>
+            <a:endParaRPr b="0" lang="en-US" sz="1800" spc="-1" strike="noStrike">
+              <a:latin typeface="Arial"/>
+            </a:endParaRPr>
+          </a:p>
+          <a:p>
+            <a:pPr lvl="5" marL="2592000" indent="-216000">
+              <a:spcBef>
+                <a:spcPts val="283"/>
+              </a:spcBef>
+              <a:buClr>
+                <a:srgbClr val="000000"/>
+              </a:buClr>
+              <a:buSzPct val="45000"/>
+              <a:buFont typeface="Wingdings" charset="2"/>
+              <a:buChar char=""/>
+            </a:pPr>
+            <a:r>
+              <a:rPr b="0" lang="en-US" sz="1800" spc="-1" strike="noStrike">
+                <a:latin typeface="Arial"/>
+              </a:rPr>
+              <a:t>Sixth Outline Level</a:t>
+            </a:r>
+            <a:endParaRPr b="0" lang="en-US" sz="1800" spc="-1" strike="noStrike">
+              <a:latin typeface="Arial"/>
+            </a:endParaRPr>
+          </a:p>
+          <a:p>
+            <a:pPr lvl="6" marL="3024000" indent="-216000">
+              <a:spcBef>
+                <a:spcPts val="283"/>
+              </a:spcBef>
+              <a:buClr>
+                <a:srgbClr val="000000"/>
+              </a:buClr>
+              <a:buSzPct val="45000"/>
+              <a:buFont typeface="Wingdings" charset="2"/>
+              <a:buChar char=""/>
+            </a:pPr>
+            <a:r>
+              <a:rPr b="0" lang="en-US" sz="1800" spc="-1" strike="noStrike">
+                <a:latin typeface="Arial"/>
+              </a:rPr>
+              <a:t>Seventh Outline Level</a:t>
             </a:r>
             <a:endParaRPr b="0" lang="en-US" sz="1800" spc="-1" strike="noStrike">
               <a:latin typeface="Arial"/>
@@ -1856,7 +2039,7 @@
       </p:grpSpPr>
       <p:sp>
         <p:nvSpPr>
-          <p:cNvPr id="37" name="PlaceHolder 1"/>
+          <p:cNvPr id="38" name="PlaceHolder 1"/>
           <p:cNvSpPr>
             <a:spLocks noGrp="1"/>
           </p:cNvSpPr>
@@ -1867,7 +2050,7 @@
         <p:spPr>
           <a:xfrm>
             <a:off x="504000" y="226080"/>
-            <a:ext cx="9071280" cy="946080"/>
+            <a:ext cx="9070920" cy="945720"/>
           </a:xfrm>
           <a:prstGeom prst="rect">
             <a:avLst/>
@@ -1901,26 +2084,27 @@
       </p:sp>
       <p:graphicFrame>
         <p:nvGraphicFramePr>
-          <p:cNvPr id="38" name=""/>
+          <p:cNvPr id="39" name=""/>
           <p:cNvGraphicFramePr/>
           <p:nvPr/>
         </p:nvGraphicFramePr>
         <p:xfrm>
-          <a:off x="4546440" y="2156400"/>
-          <a:ext cx="5208480" cy="1403640"/>
+          <a:off x="4540680" y="1414080"/>
+          <a:ext cx="5208120" cy="1384920"/>
         </p:xfrm>
         <a:graphic>
           <a:graphicData uri="http://schemas.openxmlformats.org/drawingml/2006/table">
             <a:tbl>
               <a:tblPr/>
               <a:tblGrid>
-                <a:gridCol w="1002960"/>
+                <a:gridCol w="272880"/>
+                <a:gridCol w="730080"/>
                 <a:gridCol w="1600560"/>
                 <a:gridCol w="1301760"/>
                 <a:gridCol w="1303200"/>
               </a:tblGrid>
               <a:tr h="331200">
-                <a:tc gridSpan="2">
+                <a:tc gridSpan="3">
                   <a:txBody>
                     <a:bodyPr lIns="90000" rIns="90000" anchor="t">
                       <a:noAutofit/>
@@ -1965,6 +2149,13 @@
                     </a:lnB>
                     <a:solidFill>
                       <a:srgbClr val="b3b3b3"/>
+                    </a:solidFill>
+                  </a:tcPr>
+                </a:tc>
+                <a:tc hMerge="1">
+                  <a:tcPr anchor="t" marL="90000" marR="90000">
+                    <a:solidFill>
+                      <a:srgbClr val="729fcf"/>
                     </a:solidFill>
                   </a:tcPr>
                 </a:tc>
@@ -2073,7 +2264,7 @@
                 </a:tc>
               </a:tr>
               <a:tr h="354240">
-                <a:tc>
+                <a:tc gridSpan="2">
                   <a:txBody>
                     <a:bodyPr lIns="90000" rIns="90000" anchor="t">
                       <a:noAutofit/>
@@ -2118,6 +2309,13 @@
                     </a:lnB>
                     <a:solidFill>
                       <a:srgbClr val="cccccc"/>
+                    </a:solidFill>
+                  </a:tcPr>
+                </a:tc>
+                <a:tc hMerge="1">
+                  <a:tcPr anchor="t" marL="90000" marR="90000">
+                    <a:solidFill>
+                      <a:srgbClr val="729fcf"/>
                     </a:solidFill>
                   </a:tcPr>
                 </a:tc>
@@ -2184,7 +2382,7 @@
                         <a:rPr b="0" lang="en-US" sz="1200" spc="-1" strike="noStrike">
                           <a:latin typeface="Arial"/>
                         </a:rPr>
-                        <a:t>22.00%</a:t>
+                        <a:t>-22.00%</a:t>
                       </a:r>
                       <a:endParaRPr b="0" lang="en-US" sz="1200" spc="-1" strike="noStrike">
                         <a:latin typeface="Arial"/>
@@ -2232,7 +2430,7 @@
                         <a:rPr b="0" lang="en-US" sz="1200" spc="-1" strike="noStrike">
                           <a:latin typeface="Arial"/>
                         </a:rPr>
-                        <a:t>23.31%</a:t>
+                        <a:t>-22.31%</a:t>
                       </a:r>
                       <a:endParaRPr b="0" lang="en-US" sz="1200" spc="-1" strike="noStrike">
                         <a:latin typeface="Arial"/>
@@ -2267,7 +2465,7 @@
                 </a:tc>
               </a:tr>
               <a:tr h="349920">
-                <a:tc>
+                <a:tc gridSpan="2">
                   <a:txBody>
                     <a:bodyPr lIns="90000" rIns="90000" anchor="t">
                       <a:noAutofit/>
@@ -2315,6 +2513,13 @@
                     </a:solidFill>
                   </a:tcPr>
                 </a:tc>
+                <a:tc hMerge="1">
+                  <a:tcPr anchor="t" marL="90000" marR="90000">
+                    <a:solidFill>
+                      <a:srgbClr val="729fcf"/>
+                    </a:solidFill>
+                  </a:tcPr>
+                </a:tc>
                 <a:tc>
                   <a:txBody>
                     <a:bodyPr lIns="90000" rIns="90000" anchor="t">
@@ -2330,7 +2535,7 @@
                         <a:rPr b="0" lang="en-US" sz="1200" spc="-1" strike="noStrike">
                           <a:latin typeface="Arial"/>
                         </a:rPr>
-                        <a:t>Redd.Op. / Cap.Inv.</a:t>
+                        <a:t>EBIT / Cap.Inv.</a:t>
                       </a:r>
                       <a:endParaRPr b="0" lang="en-US" sz="1200" spc="-1" strike="noStrike">
                         <a:latin typeface="Arial"/>
@@ -2467,11 +2672,304 @@
                       <a:noAutofit/>
                     </a:bodyPr>
                     <a:p>
+                      <a:pPr>
+                        <a:lnSpc>
+                          <a:spcPct val="100000"/>
+                        </a:lnSpc>
+                      </a:pPr>
                       <a:r>
                         <a:rPr b="0" lang="en-US" sz="1200" spc="-1" strike="noStrike">
                           <a:latin typeface="Arial"/>
                         </a:rPr>
                         <a:t>ROS</a:t>
+                      </a:r>
+                      <a:endParaRPr b="0" lang="en-US" sz="1200" spc="-1" strike="noStrike">
+                        <a:latin typeface="Arial"/>
+                      </a:endParaRPr>
+                    </a:p>
+                  </a:txBody>
+                  <a:tcPr anchor="t" marL="90000" marR="90000">
+                    <a:lnL w="720">
+                      <a:solidFill>
+                        <a:srgbClr val="ffffff"/>
+                      </a:solidFill>
+                    </a:lnL>
+                    <a:lnR w="720">
+                      <a:solidFill>
+                        <a:srgbClr val="ffffff"/>
+                      </a:solidFill>
+                    </a:lnR>
+                    <a:lnT w="720">
+                      <a:solidFill>
+                        <a:srgbClr val="ffffff"/>
+                      </a:solidFill>
+                    </a:lnT>
+                    <a:lnB w="720">
+                      <a:solidFill>
+                        <a:srgbClr val="ffffff"/>
+                      </a:solidFill>
+                    </a:lnB>
+                    <a:solidFill>
+                      <a:srgbClr val="e6e6e6"/>
+                    </a:solidFill>
+                  </a:tcPr>
+                </a:tc>
+                <a:tc>
+                  <a:txBody>
+                    <a:bodyPr lIns="90000" rIns="90000" tIns="45000" bIns="45000" anchor="t">
+                      <a:noAutofit/>
+                    </a:bodyPr>
+                    <a:p>
+                      <a:pPr>
+                        <a:lnSpc>
+                          <a:spcPct val="100000"/>
+                        </a:lnSpc>
+                      </a:pPr>
+                      <a:r>
+                        <a:rPr b="0" lang="en-US" sz="1200" spc="-1" strike="noStrike">
+                          <a:latin typeface="Arial"/>
+                        </a:rPr>
+                        <a:t>ROS</a:t>
+                      </a:r>
+                      <a:endParaRPr b="0" lang="en-US" sz="1200" spc="-1" strike="noStrike">
+                        <a:latin typeface="Arial"/>
+                      </a:endParaRPr>
+                    </a:p>
+                  </a:txBody>
+                  <a:tcPr anchor="t" marL="90000" marR="90000">
+                    <a:solidFill>
+                      <a:srgbClr val="729fcf"/>
+                    </a:solidFill>
+                  </a:tcPr>
+                </a:tc>
+                <a:tc>
+                  <a:txBody>
+                    <a:bodyPr lIns="90000" rIns="90000" anchor="t">
+                      <a:noAutofit/>
+                    </a:bodyPr>
+                    <a:p>
+                      <a:pPr>
+                        <a:lnSpc>
+                          <a:spcPct val="100000"/>
+                        </a:lnSpc>
+                      </a:pPr>
+                      <a:r>
+                        <a:rPr b="0" lang="en-US" sz="1200" spc="-1" strike="noStrike">
+                          <a:latin typeface="Arial"/>
+                        </a:rPr>
+                        <a:t>EBIT. / Vendite</a:t>
+                      </a:r>
+                      <a:endParaRPr b="0" lang="en-US" sz="1200" spc="-1" strike="noStrike">
+                        <a:latin typeface="Arial"/>
+                      </a:endParaRPr>
+                    </a:p>
+                  </a:txBody>
+                  <a:tcPr anchor="t" marL="90000" marR="90000">
+                    <a:lnL w="720">
+                      <a:solidFill>
+                        <a:srgbClr val="ffffff"/>
+                      </a:solidFill>
+                    </a:lnL>
+                    <a:lnR w="720">
+                      <a:solidFill>
+                        <a:srgbClr val="ffffff"/>
+                      </a:solidFill>
+                    </a:lnR>
+                    <a:lnT w="720">
+                      <a:solidFill>
+                        <a:srgbClr val="ffffff"/>
+                      </a:solidFill>
+                    </a:lnT>
+                    <a:lnB w="720">
+                      <a:solidFill>
+                        <a:srgbClr val="ffffff"/>
+                      </a:solidFill>
+                    </a:lnB>
+                    <a:solidFill>
+                      <a:srgbClr val="e6e6e6"/>
+                    </a:solidFill>
+                  </a:tcPr>
+                </a:tc>
+                <a:tc>
+                  <a:txBody>
+                    <a:bodyPr lIns="90000" rIns="90000" anchor="t">
+                      <a:noAutofit/>
+                    </a:bodyPr>
+                    <a:p>
+                      <a:pPr>
+                        <a:lnSpc>
+                          <a:spcPct val="100000"/>
+                        </a:lnSpc>
+                      </a:pPr>
+                      <a:r>
+                        <a:rPr b="0" lang="en-US" sz="1200" spc="-1" strike="noStrike">
+                          <a:latin typeface="Arial"/>
+                        </a:rPr>
+                        <a:t>0.44%</a:t>
+                      </a:r>
+                      <a:endParaRPr b="0" lang="en-US" sz="1200" spc="-1" strike="noStrike">
+                        <a:latin typeface="Arial"/>
+                      </a:endParaRPr>
+                    </a:p>
+                  </a:txBody>
+                  <a:tcPr anchor="t" marL="90000" marR="90000">
+                    <a:lnL w="720">
+                      <a:solidFill>
+                        <a:srgbClr val="ffffff"/>
+                      </a:solidFill>
+                    </a:lnL>
+                    <a:lnR w="720">
+                      <a:solidFill>
+                        <a:srgbClr val="ffffff"/>
+                      </a:solidFill>
+                    </a:lnR>
+                    <a:lnT w="720">
+                      <a:solidFill>
+                        <a:srgbClr val="ffffff"/>
+                      </a:solidFill>
+                    </a:lnT>
+                    <a:lnB w="720">
+                      <a:solidFill>
+                        <a:srgbClr val="ffffff"/>
+                      </a:solidFill>
+                    </a:lnB>
+                    <a:solidFill>
+                      <a:srgbClr val="e6e6e6"/>
+                    </a:solidFill>
+                  </a:tcPr>
+                </a:tc>
+                <a:tc>
+                  <a:txBody>
+                    <a:bodyPr lIns="90000" rIns="90000" anchor="t">
+                      <a:noAutofit/>
+                    </a:bodyPr>
+                    <a:p>
+                      <a:pPr>
+                        <a:lnSpc>
+                          <a:spcPct val="100000"/>
+                        </a:lnSpc>
+                      </a:pPr>
+                      <a:r>
+                        <a:rPr b="0" lang="en-US" sz="1200" spc="-1" strike="noStrike">
+                          <a:latin typeface="Arial"/>
+                        </a:rPr>
+                        <a:t>0.35%</a:t>
+                      </a:r>
+                      <a:endParaRPr b="0" lang="en-US" sz="1200" spc="-1" strike="noStrike">
+                        <a:latin typeface="Arial"/>
+                      </a:endParaRPr>
+                    </a:p>
+                  </a:txBody>
+                  <a:tcPr anchor="t" marL="90000" marR="90000">
+                    <a:lnL w="720">
+                      <a:solidFill>
+                        <a:srgbClr val="ffffff"/>
+                      </a:solidFill>
+                    </a:lnL>
+                    <a:lnR w="720">
+                      <a:solidFill>
+                        <a:srgbClr val="ffffff"/>
+                      </a:solidFill>
+                    </a:lnR>
+                    <a:lnT w="720">
+                      <a:solidFill>
+                        <a:srgbClr val="ffffff"/>
+                      </a:solidFill>
+                    </a:lnT>
+                    <a:lnB w="720">
+                      <a:solidFill>
+                        <a:srgbClr val="ffffff"/>
+                      </a:solidFill>
+                    </a:lnB>
+                    <a:solidFill>
+                      <a:srgbClr val="e6e6e6"/>
+                    </a:solidFill>
+                  </a:tcPr>
+                </a:tc>
+              </a:tr>
+              <a:tr h="349920">
+                <a:tc>
+                  <a:txBody>
+                    <a:bodyPr lIns="90000" rIns="90000" anchor="t">
+                      <a:noAutofit/>
+                    </a:bodyPr>
+                    <a:p>
+                      <a:r>
+                        <a:rPr b="0" lang="en-US" sz="1200" spc="-1" strike="noStrike">
+                          <a:latin typeface="Arial"/>
+                        </a:rPr>
+                        <a:t>ROT</a:t>
+                      </a:r>
+                      <a:endParaRPr b="0" lang="en-US" sz="1200" spc="-1" strike="noStrike">
+                        <a:latin typeface="Arial"/>
+                      </a:endParaRPr>
+                    </a:p>
+                  </a:txBody>
+                  <a:tcPr anchor="t" marL="90000" marR="90000">
+                    <a:lnL w="720">
+                      <a:solidFill>
+                        <a:srgbClr val="ffffff"/>
+                      </a:solidFill>
+                    </a:lnL>
+                    <a:lnR w="720">
+                      <a:solidFill>
+                        <a:srgbClr val="ffffff"/>
+                      </a:solidFill>
+                    </a:lnR>
+                    <a:lnT w="720">
+                      <a:solidFill>
+                        <a:srgbClr val="ffffff"/>
+                      </a:solidFill>
+                    </a:lnT>
+                    <a:lnB w="720">
+                      <a:solidFill>
+                        <a:srgbClr val="ffffff"/>
+                      </a:solidFill>
+                    </a:lnB>
+                    <a:solidFill>
+                      <a:srgbClr val="e6e6e6"/>
+                    </a:solidFill>
+                  </a:tcPr>
+                </a:tc>
+                <a:tc>
+                  <a:txBody>
+                    <a:bodyPr lIns="90000" rIns="90000" tIns="45000" bIns="45000" anchor="t">
+                      <a:noAutofit/>
+                    </a:bodyPr>
+                    <a:p>
+                      <a:pPr>
+                        <a:lnSpc>
+                          <a:spcPct val="100000"/>
+                        </a:lnSpc>
+                      </a:pPr>
+                      <a:r>
+                        <a:rPr b="0" lang="en-US" sz="1200" spc="-1" strike="noStrike">
+                          <a:latin typeface="Arial"/>
+                        </a:rPr>
+                        <a:t>ROT</a:t>
+                      </a:r>
+                      <a:endParaRPr b="0" lang="en-US" sz="1200" spc="-1" strike="noStrike">
+                        <a:latin typeface="Arial"/>
+                      </a:endParaRPr>
+                    </a:p>
+                  </a:txBody>
+                  <a:tcPr anchor="t" marL="90000" marR="90000">
+                    <a:solidFill>
+                      <a:srgbClr val="729fcf"/>
+                    </a:solidFill>
+                  </a:tcPr>
+                </a:tc>
+                <a:tc>
+                  <a:txBody>
+                    <a:bodyPr lIns="90000" rIns="90000" anchor="t">
+                      <a:noAutofit/>
+                    </a:bodyPr>
+                    <a:p>
+                      <a:r>
+                        <a:rPr b="0" lang="en-US" sz="1200" spc="-1" strike="noStrike">
+                          <a:latin typeface="Arial"/>
+                        </a:rPr>
+                        <a:t>Vendite / Cap.Inv. </a:t>
                       </a:r>
                       <a:endParaRPr b="0" lang="en-US" sz="1200" spc="-1" strike="noStrike">
                         <a:latin typeface="Arial"/>
@@ -2514,7 +3012,7 @@
                         <a:rPr b="0" lang="en-US" sz="1200" spc="-1" strike="noStrike">
                           <a:latin typeface="Arial"/>
                         </a:rPr>
-                        <a:t>Redd.Op. / Vendite</a:t>
+                        <a:t>3.03</a:t>
                       </a:r>
                       <a:endParaRPr b="0" lang="en-US" sz="1200" spc="-1" strike="noStrike">
                         <a:latin typeface="Arial"/>
@@ -2557,7 +3055,102 @@
                         <a:rPr b="0" lang="en-US" sz="1200" spc="-1" strike="noStrike">
                           <a:latin typeface="Arial"/>
                         </a:rPr>
-                        <a:t>0.44%</a:t>
+                        <a:t>2.26</a:t>
+                      </a:r>
+                      <a:endParaRPr b="0" lang="en-US" sz="1200" spc="-1" strike="noStrike">
+                        <a:latin typeface="Arial"/>
+                      </a:endParaRPr>
+                    </a:p>
+                  </a:txBody>
+                  <a:tcPr anchor="t" marL="90000" marR="90000">
+                    <a:lnL w="720">
+                      <a:solidFill>
+                        <a:srgbClr val="ffffff"/>
+                      </a:solidFill>
+                    </a:lnL>
+                    <a:lnR w="720">
+                      <a:solidFill>
+                        <a:srgbClr val="ffffff"/>
+                      </a:solidFill>
+                    </a:lnR>
+                    <a:lnT w="720">
+                      <a:solidFill>
+                        <a:srgbClr val="ffffff"/>
+                      </a:solidFill>
+                    </a:lnT>
+                    <a:lnB w="720">
+                      <a:solidFill>
+                        <a:srgbClr val="ffffff"/>
+                      </a:solidFill>
+                    </a:lnB>
+                    <a:solidFill>
+                      <a:srgbClr val="e6e6e6"/>
+                    </a:solidFill>
+                  </a:tcPr>
+                </a:tc>
+              </a:tr>
+              <a:tr h="349920">
+                <a:tc gridSpan="2">
+                  <a:txBody>
+                    <a:bodyPr lIns="90000" rIns="90000" anchor="t">
+                      <a:noAutofit/>
+                    </a:bodyPr>
+                    <a:p>
+                      <a:r>
+                        <a:rPr b="0" lang="en-US" sz="1200" spc="-1" strike="noStrike">
+                          <a:latin typeface="Arial"/>
+                        </a:rPr>
+                        <a:t>ROD</a:t>
+                      </a:r>
+                      <a:endParaRPr b="0" lang="en-US" sz="1200" spc="-1" strike="noStrike">
+                        <a:latin typeface="Arial"/>
+                      </a:endParaRPr>
+                    </a:p>
+                  </a:txBody>
+                  <a:tcPr anchor="t" marL="90000" marR="90000">
+                    <a:lnL w="720">
+                      <a:solidFill>
+                        <a:srgbClr val="ffffff"/>
+                      </a:solidFill>
+                    </a:lnL>
+                    <a:lnR w="720">
+                      <a:solidFill>
+                        <a:srgbClr val="ffffff"/>
+                      </a:solidFill>
+                    </a:lnR>
+                    <a:lnT w="720">
+                      <a:solidFill>
+                        <a:srgbClr val="ffffff"/>
+                      </a:solidFill>
+                    </a:lnT>
+                    <a:lnB w="720">
+                      <a:solidFill>
+                        <a:srgbClr val="ffffff"/>
+                      </a:solidFill>
+                    </a:lnB>
+                    <a:solidFill>
+                      <a:srgbClr val="e6e6e6"/>
+                    </a:solidFill>
+                  </a:tcPr>
+                </a:tc>
+                <a:tc hMerge="1">
+                  <a:tcPr anchor="t" marL="90000" marR="90000">
+                    <a:solidFill>
+                      <a:srgbClr val="729fcf"/>
+                    </a:solidFill>
+                  </a:tcPr>
+                </a:tc>
+                <a:tc>
+                  <a:txBody>
+                    <a:bodyPr lIns="90000" rIns="90000" anchor="t">
+                      <a:noAutofit/>
+                    </a:bodyPr>
+                    <a:p>
+                      <a:r>
+                        <a:rPr b="0" lang="en-US" sz="1200" spc="-1" strike="noStrike">
+                          <a:latin typeface="Arial"/>
+                        </a:rPr>
+                        <a:t>Oneri.F. / Mezzi.T.F.</a:t>
                       </a:r>
                       <a:endParaRPr b="0" lang="en-US" sz="1200" spc="-1" strike="noStrike">
                         <a:latin typeface="Arial"/>
@@ -2600,13 +3193,322 @@
                         <a:rPr b="0" lang="en-US" sz="1200" spc="-1" strike="noStrike">
                           <a:latin typeface="Arial"/>
                         </a:rPr>
-                        <a:t>0.35%</a:t>
+                        <a:t>3.96%</a:t>
                       </a:r>
                       <a:endParaRPr b="0" lang="en-US" sz="1200" spc="-1" strike="noStrike">
                         <a:latin typeface="Arial"/>
                       </a:endParaRPr>
                     </a:p>
                   </a:txBody>
+                  <a:tcPr anchor="t" marL="90000" marR="90000">
+                    <a:lnL w="720">
+                      <a:solidFill>
+                        <a:srgbClr val="ffffff"/>
+                      </a:solidFill>
+                    </a:lnL>
+                    <a:lnR w="720">
+                      <a:solidFill>
+                        <a:srgbClr val="ffffff"/>
+                      </a:solidFill>
+                    </a:lnR>
+                    <a:lnT w="720">
+                      <a:solidFill>
+                        <a:srgbClr val="ffffff"/>
+                      </a:solidFill>
+                    </a:lnT>
+                    <a:lnB w="720">
+                      <a:solidFill>
+                        <a:srgbClr val="ffffff"/>
+                      </a:solidFill>
+                    </a:lnB>
+                    <a:solidFill>
+                      <a:srgbClr val="e6e6e6"/>
+                    </a:solidFill>
+                  </a:tcPr>
+                </a:tc>
+                <a:tc>
+                  <a:txBody>
+                    <a:bodyPr lIns="90000" rIns="90000" anchor="t">
+                      <a:noAutofit/>
+                    </a:bodyPr>
+                    <a:p>
+                      <a:r>
+                        <a:rPr b="0" lang="en-US" sz="1200" spc="-1" strike="noStrike">
+                          <a:latin typeface="Arial"/>
+                        </a:rPr>
+                        <a:t>2.03%</a:t>
+                      </a:r>
+                      <a:endParaRPr b="0" lang="en-US" sz="1200" spc="-1" strike="noStrike">
+                        <a:latin typeface="Arial"/>
+                      </a:endParaRPr>
+                    </a:p>
+                  </a:txBody>
+                  <a:tcPr anchor="t" marL="90000" marR="90000">
+                    <a:lnL w="720">
+                      <a:solidFill>
+                        <a:srgbClr val="ffffff"/>
+                      </a:solidFill>
+                    </a:lnL>
+                    <a:lnR w="720">
+                      <a:solidFill>
+                        <a:srgbClr val="ffffff"/>
+                      </a:solidFill>
+                    </a:lnR>
+                    <a:lnT w="720">
+                      <a:solidFill>
+                        <a:srgbClr val="ffffff"/>
+                      </a:solidFill>
+                    </a:lnT>
+                    <a:lnB w="720">
+                      <a:solidFill>
+                        <a:srgbClr val="ffffff"/>
+                      </a:solidFill>
+                    </a:lnB>
+                    <a:solidFill>
+                      <a:srgbClr val="e6e6e6"/>
+                    </a:solidFill>
+                  </a:tcPr>
+                </a:tc>
+              </a:tr>
+              <a:tr h="349920">
+                <a:tc gridSpan="2">
+                  <a:txBody>
+                    <a:bodyPr lIns="90000" rIns="90000" anchor="t">
+                      <a:noAutofit/>
+                    </a:bodyPr>
+                    <a:p>
+                      <a:r>
+                        <a:rPr b="0" lang="en-US" sz="1200" spc="-1" strike="noStrike">
+                          <a:latin typeface="Arial"/>
+                        </a:rPr>
+                        <a:t>q</a:t>
+                      </a:r>
+                      <a:endParaRPr b="0" lang="en-US" sz="1200" spc="-1" strike="noStrike">
+                        <a:latin typeface="Arial"/>
+                      </a:endParaRPr>
+                    </a:p>
+                  </a:txBody>
+                  <a:tcPr anchor="t" marL="90000" marR="90000">
+                    <a:lnL w="720">
+                      <a:solidFill>
+                        <a:srgbClr val="ffffff"/>
+                      </a:solidFill>
+                    </a:lnL>
+                    <a:lnR w="720">
+                      <a:solidFill>
+                        <a:srgbClr val="ffffff"/>
+                      </a:solidFill>
+                    </a:lnR>
+                    <a:lnT w="720">
+                      <a:solidFill>
+                        <a:srgbClr val="ffffff"/>
+                      </a:solidFill>
+                    </a:lnT>
+                    <a:lnB w="720">
+                      <a:solidFill>
+                        <a:srgbClr val="ffffff"/>
+                      </a:solidFill>
+                    </a:lnB>
+                    <a:solidFill>
+                      <a:srgbClr val="e6e6e6"/>
+                    </a:solidFill>
+                  </a:tcPr>
+                </a:tc>
+                <a:tc hMerge="1">
+                  <a:tcPr anchor="t" marL="90000" marR="90000">
+                    <a:solidFill>
+                      <a:srgbClr val="729fcf"/>
+                    </a:solidFill>
+                  </a:tcPr>
+                </a:tc>
+                <a:tc>
+                  <a:tcPr anchor="t" marL="90000" marR="90000">
+                    <a:lnL w="720">
+                      <a:solidFill>
+                        <a:srgbClr val="ffffff"/>
+                      </a:solidFill>
+                    </a:lnL>
+                    <a:lnR w="720">
+                      <a:solidFill>
+                        <a:srgbClr val="ffffff"/>
+                      </a:solidFill>
+                    </a:lnR>
+                    <a:lnT w="720">
+                      <a:solidFill>
+                        <a:srgbClr val="ffffff"/>
+                      </a:solidFill>
+                    </a:lnT>
+                    <a:lnB w="720">
+                      <a:solidFill>
+                        <a:srgbClr val="ffffff"/>
+                      </a:solidFill>
+                    </a:lnB>
+                    <a:solidFill>
+                      <a:srgbClr val="e6e6e6"/>
+                    </a:solidFill>
+                  </a:tcPr>
+                </a:tc>
+                <a:tc>
+                  <a:tcPr anchor="t" marL="90000" marR="90000">
+                    <a:lnL w="720">
+                      <a:solidFill>
+                        <a:srgbClr val="ffffff"/>
+                      </a:solidFill>
+                    </a:lnL>
+                    <a:lnR w="720">
+                      <a:solidFill>
+                        <a:srgbClr val="ffffff"/>
+                      </a:solidFill>
+                    </a:lnR>
+                    <a:lnT w="720">
+                      <a:solidFill>
+                        <a:srgbClr val="ffffff"/>
+                      </a:solidFill>
+                    </a:lnT>
+                    <a:lnB w="720">
+                      <a:solidFill>
+                        <a:srgbClr val="ffffff"/>
+                      </a:solidFill>
+                    </a:lnB>
+                    <a:solidFill>
+                      <a:srgbClr val="e6e6e6"/>
+                    </a:solidFill>
+                  </a:tcPr>
+                </a:tc>
+                <a:tc>
+                  <a:tcPr anchor="t" marL="90000" marR="90000">
+                    <a:lnL w="720">
+                      <a:solidFill>
+                        <a:srgbClr val="ffffff"/>
+                      </a:solidFill>
+                    </a:lnL>
+                    <a:lnR w="720">
+                      <a:solidFill>
+                        <a:srgbClr val="ffffff"/>
+                      </a:solidFill>
+                    </a:lnR>
+                    <a:lnT w="720">
+                      <a:solidFill>
+                        <a:srgbClr val="ffffff"/>
+                      </a:solidFill>
+                    </a:lnT>
+                    <a:lnB w="720">
+                      <a:solidFill>
+                        <a:srgbClr val="ffffff"/>
+                      </a:solidFill>
+                    </a:lnB>
+                    <a:solidFill>
+                      <a:srgbClr val="e6e6e6"/>
+                    </a:solidFill>
+                  </a:tcPr>
+                </a:tc>
+              </a:tr>
+              <a:tr h="349920">
+                <a:tc gridSpan="2">
+                  <a:txBody>
+                    <a:bodyPr lIns="90000" rIns="90000" anchor="t">
+                      <a:noAutofit/>
+                    </a:bodyPr>
+                    <a:p>
+                      <a:r>
+                        <a:rPr b="0" lang="en-US" sz="1200" spc="-1" strike="noStrike">
+                          <a:latin typeface="Arial"/>
+                        </a:rPr>
+                        <a:t>S</a:t>
+                      </a:r>
+                      <a:endParaRPr b="0" lang="en-US" sz="1200" spc="-1" strike="noStrike">
+                        <a:latin typeface="Arial"/>
+                      </a:endParaRPr>
+                    </a:p>
+                  </a:txBody>
+                  <a:tcPr anchor="t" marL="90000" marR="90000">
+                    <a:lnL w="720">
+                      <a:solidFill>
+                        <a:srgbClr val="ffffff"/>
+                      </a:solidFill>
+                    </a:lnL>
+                    <a:lnR w="720">
+                      <a:solidFill>
+                        <a:srgbClr val="ffffff"/>
+                      </a:solidFill>
+                    </a:lnR>
+                    <a:lnT w="720">
+                      <a:solidFill>
+                        <a:srgbClr val="ffffff"/>
+                      </a:solidFill>
+                    </a:lnT>
+                    <a:lnB w="720">
+                      <a:solidFill>
+                        <a:srgbClr val="ffffff"/>
+                      </a:solidFill>
+                    </a:lnB>
+                    <a:solidFill>
+                      <a:srgbClr val="e6e6e6"/>
+                    </a:solidFill>
+                  </a:tcPr>
+                </a:tc>
+                <a:tc hMerge="1">
+                  <a:tcPr anchor="t" marL="90000" marR="90000">
+                    <a:solidFill>
+                      <a:srgbClr val="729fcf"/>
+                    </a:solidFill>
+                  </a:tcPr>
+                </a:tc>
+                <a:tc>
+                  <a:tcPr anchor="t" marL="90000" marR="90000">
+                    <a:lnL w="720">
+                      <a:solidFill>
+                        <a:srgbClr val="ffffff"/>
+                      </a:solidFill>
+                    </a:lnL>
+                    <a:lnR w="720">
+                      <a:solidFill>
+                        <a:srgbClr val="ffffff"/>
+                      </a:solidFill>
+                    </a:lnR>
+                    <a:lnT w="720">
+                      <a:solidFill>
+                        <a:srgbClr val="ffffff"/>
+                      </a:solidFill>
+                    </a:lnT>
+                    <a:lnB w="720">
+                      <a:solidFill>
+                        <a:srgbClr val="ffffff"/>
+                      </a:solidFill>
+                    </a:lnB>
+                    <a:solidFill>
+                      <a:srgbClr val="e6e6e6"/>
+                    </a:solidFill>
+                  </a:tcPr>
+                </a:tc>
+                <a:tc>
+                  <a:tcPr anchor="t" marL="90000" marR="90000">
+                    <a:lnL w="720">
+                      <a:solidFill>
+                        <a:srgbClr val="ffffff"/>
+                      </a:solidFill>
+                    </a:lnL>
+                    <a:lnR w="720">
+                      <a:solidFill>
+                        <a:srgbClr val="ffffff"/>
+                      </a:solidFill>
+                    </a:lnR>
+                    <a:lnT w="720">
+                      <a:solidFill>
+                        <a:srgbClr val="ffffff"/>
+                      </a:solidFill>
+                    </a:lnT>
+                    <a:lnB w="720">
+                      <a:solidFill>
+                        <a:srgbClr val="ffffff"/>
+                      </a:solidFill>
+                    </a:lnB>
+                    <a:solidFill>
+                      <a:srgbClr val="e6e6e6"/>
+                    </a:solidFill>
+                  </a:tcPr>
+                </a:tc>
+                <a:tc>
                   <a:tcPr anchor="t" marL="90000" marR="90000">
                     <a:lnL w="720">
                       <a:solidFill>
@@ -2640,13 +3542,13 @@
       </p:graphicFrame>
       <p:graphicFrame>
         <p:nvGraphicFramePr>
-          <p:cNvPr id="39" name=""/>
+          <p:cNvPr id="40" name=""/>
           <p:cNvGraphicFramePr/>
           <p:nvPr/>
         </p:nvGraphicFramePr>
         <p:xfrm>
           <a:off x="266760" y="1172160"/>
-          <a:ext cx="4762440" cy="3251160"/>
+          <a:ext cx="4762080" cy="3250800"/>
         </p:xfrm>
         <a:graphic>
           <a:graphicData uri="http://schemas.openxmlformats.org/drawingml/2006/chart">
@@ -2656,28 +3558,39 @@
       </p:graphicFrame>
       <p:sp>
         <p:nvSpPr>
-          <p:cNvPr id="40" name=""/>
-          <p:cNvSpPr txBox="1"/>
+          <p:cNvPr id="41" name=""/>
+          <p:cNvSpPr/>
           <p:nvPr/>
         </p:nvSpPr>
         <p:spPr>
           <a:xfrm>
             <a:off x="685800" y="3657600"/>
-            <a:ext cx="826920" cy="346320"/>
-          </a:xfrm>
-          <a:prstGeom prst="rect">
-            <a:avLst/>
-          </a:prstGeom>
-          <a:noFill/>
-          <a:ln w="0">
-            <a:noFill/>
-          </a:ln>
-        </p:spPr>
+            <a:ext cx="826560" cy="345960"/>
+          </a:xfrm>
+          <a:prstGeom prst="rect">
+            <a:avLst/>
+          </a:prstGeom>
+          <a:noFill/>
+          <a:ln w="0">
+            <a:noFill/>
+          </a:ln>
+        </p:spPr>
+        <p:style>
+          <a:lnRef idx="0"/>
+          <a:fillRef idx="0"/>
+          <a:effectRef idx="0"/>
+          <a:fontRef idx="minor"/>
+        </p:style>
         <p:txBody>
           <a:bodyPr lIns="90000" rIns="90000" tIns="45000" bIns="45000" anchor="t">
             <a:noAutofit/>
           </a:bodyPr>
           <a:p>
+            <a:pPr>
+              <a:lnSpc>
+                <a:spcPct val="100000"/>
+              </a:lnSpc>
+            </a:pPr>
             <a:r>
               <a:rPr b="0" lang="en-US" sz="1800" spc="-1" strike="noStrike">
                 <a:latin typeface="Arial"/>
@@ -2692,28 +3605,39 @@
       </p:sp>
       <p:sp>
         <p:nvSpPr>
-          <p:cNvPr id="41" name=""/>
-          <p:cNvSpPr txBox="1"/>
+          <p:cNvPr id="42" name=""/>
+          <p:cNvSpPr/>
           <p:nvPr/>
         </p:nvSpPr>
         <p:spPr>
           <a:xfrm>
             <a:off x="1828800" y="2854080"/>
-            <a:ext cx="914400" cy="346320"/>
-          </a:xfrm>
-          <a:prstGeom prst="rect">
-            <a:avLst/>
-          </a:prstGeom>
-          <a:noFill/>
-          <a:ln w="0">
-            <a:noFill/>
-          </a:ln>
-        </p:spPr>
+            <a:ext cx="914040" cy="345960"/>
+          </a:xfrm>
+          <a:prstGeom prst="rect">
+            <a:avLst/>
+          </a:prstGeom>
+          <a:noFill/>
+          <a:ln w="0">
+            <a:noFill/>
+          </a:ln>
+        </p:spPr>
+        <p:style>
+          <a:lnRef idx="0"/>
+          <a:fillRef idx="0"/>
+          <a:effectRef idx="0"/>
+          <a:fontRef idx="minor"/>
+        </p:style>
         <p:txBody>
           <a:bodyPr lIns="90000" rIns="90000" tIns="45000" bIns="45000" anchor="t">
             <a:noAutofit/>
           </a:bodyPr>
           <a:p>
+            <a:pPr>
+              <a:lnSpc>
+                <a:spcPct val="100000"/>
+              </a:lnSpc>
+            </a:pPr>
             <a:r>
               <a:rPr b="0" lang="en-US" sz="1800" spc="-1" strike="noStrike">
                 <a:latin typeface="Arial"/>
@@ -2728,28 +3652,39 @@
       </p:sp>
       <p:sp>
         <p:nvSpPr>
-          <p:cNvPr id="42" name=""/>
-          <p:cNvSpPr txBox="1"/>
+          <p:cNvPr id="43" name=""/>
+          <p:cNvSpPr/>
           <p:nvPr/>
         </p:nvSpPr>
         <p:spPr>
           <a:xfrm>
             <a:off x="2971800" y="2514600"/>
-            <a:ext cx="914400" cy="346320"/>
-          </a:xfrm>
-          <a:prstGeom prst="rect">
-            <a:avLst/>
-          </a:prstGeom>
-          <a:noFill/>
-          <a:ln w="0">
-            <a:noFill/>
-          </a:ln>
-        </p:spPr>
+            <a:ext cx="914040" cy="345960"/>
+          </a:xfrm>
+          <a:prstGeom prst="rect">
+            <a:avLst/>
+          </a:prstGeom>
+          <a:noFill/>
+          <a:ln w="0">
+            <a:noFill/>
+          </a:ln>
+        </p:spPr>
+        <p:style>
+          <a:lnRef idx="0"/>
+          <a:fillRef idx="0"/>
+          <a:effectRef idx="0"/>
+          <a:fontRef idx="minor"/>
+        </p:style>
         <p:txBody>
           <a:bodyPr lIns="90000" rIns="90000" tIns="45000" bIns="45000" anchor="t">
             <a:noAutofit/>
           </a:bodyPr>
           <a:p>
+            <a:pPr>
+              <a:lnSpc>
+                <a:spcPct val="100000"/>
+              </a:lnSpc>
+            </a:pPr>
             <a:r>
               <a:rPr b="0" lang="en-US" sz="1800" spc="-1" strike="noStrike">
                 <a:latin typeface="Arial"/>
@@ -2757,6 +3692,91 @@
               <a:t>-14.33</a:t>
             </a:r>
             <a:endParaRPr b="0" lang="en-US" sz="1800" spc="-1" strike="noStrike">
+              <a:latin typeface="Arial"/>
+            </a:endParaRPr>
+          </a:p>
+        </p:txBody>
+      </p:sp>
+      <p:sp>
+        <p:nvSpPr>
+          <p:cNvPr id="44" name=""/>
+          <p:cNvSpPr txBox="1"/>
+          <p:nvPr/>
+        </p:nvSpPr>
+        <p:spPr>
+          <a:xfrm>
+            <a:off x="4539240" y="4343400"/>
+            <a:ext cx="3233160" cy="1114200"/>
+          </a:xfrm>
+          <a:prstGeom prst="rect">
+            <a:avLst/>
+          </a:prstGeom>
+          <a:noFill/>
+          <a:ln w="0">
+            <a:noFill/>
+          </a:ln>
+        </p:spPr>
+        <p:txBody>
+          <a:bodyPr lIns="90000" rIns="90000" tIns="45000" bIns="45000" anchor="t">
+            <a:noAutofit/>
+          </a:bodyPr>
+          <a:p>
+            <a:r>
+              <a:rPr b="0" lang="en-US" sz="1200" spc="-1" strike="noStrike">
+                <a:latin typeface="Arial"/>
+              </a:rPr>
+              <a:t>Il ROE molto negativo indica un’erosione del </a:t>
+            </a:r>
+            <a:endParaRPr b="0" lang="en-US" sz="1200" spc="-1" strike="noStrike">
+              <a:latin typeface="Arial"/>
+            </a:endParaRPr>
+          </a:p>
+          <a:p>
+            <a:r>
+              <a:rPr b="0" lang="en-US" sz="1200" spc="-1" strike="noStrike">
+                <a:latin typeface="Arial"/>
+              </a:rPr>
+              <a:t>capitale netto dovuta alle perdite.</a:t>
+            </a:r>
+            <a:endParaRPr b="0" lang="en-US" sz="1200" spc="-1" strike="noStrike">
+              <a:latin typeface="Arial"/>
+            </a:endParaRPr>
+          </a:p>
+          <a:p>
+            <a:endParaRPr b="0" lang="en-US" sz="1200" spc="-1" strike="noStrike">
+              <a:latin typeface="Arial"/>
+            </a:endParaRPr>
+          </a:p>
+          <a:p>
+            <a:r>
+              <a:rPr b="0" lang="en-US" sz="1200" spc="-1" strike="noStrike">
+                <a:latin typeface="Arial"/>
+              </a:rPr>
+              <a:t>La relazione ROI &gt; ROD indica che per </a:t>
+            </a:r>
+            <a:endParaRPr b="0" lang="en-US" sz="1200" spc="-1" strike="noStrike">
+              <a:latin typeface="Arial"/>
+            </a:endParaRPr>
+          </a:p>
+          <a:p>
+            <a:r>
+              <a:rPr b="0" lang="en-US" sz="1200" spc="-1" strike="noStrike">
+                <a:latin typeface="Arial"/>
+              </a:rPr>
+              <a:t>l’impresa non e’ conveniente ricorrere a </a:t>
+            </a:r>
+            <a:endParaRPr b="0" lang="en-US" sz="1200" spc="-1" strike="noStrike">
+              <a:latin typeface="Arial"/>
+            </a:endParaRPr>
+          </a:p>
+          <a:p>
+            <a:r>
+              <a:rPr b="0" lang="en-US" sz="1200" spc="-1" strike="noStrike">
+                <a:latin typeface="Arial"/>
+              </a:rPr>
+              <a:t>mezzi di terzi finanziari.</a:t>
+            </a:r>
+            <a:endParaRPr b="0" lang="en-US" sz="1200" spc="-1" strike="noStrike">
               <a:latin typeface="Arial"/>
             </a:endParaRPr>
           </a:p>

</xml_diff>

<commit_message>
Aggiunti gli indici q e S
</commit_message>
<xml_diff>
--- a/bozza_andamento.pptx
+++ b/bozza_andamento.pptx
@@ -12,7 +12,7 @@
 </p:presentation>
 </file>
 
-<file path=ppt/charts/chart1.xml><?xml version="1.0" encoding="utf-8"?>
+<file path=ppt/charts/chart3.xml><?xml version="1.0" encoding="utf-8"?>
 <c:chartSpace xmlns:c="http://schemas.openxmlformats.org/drawingml/2006/chart" xmlns:a="http://schemas.openxmlformats.org/drawingml/2006/main" xmlns:r="http://schemas.openxmlformats.org/officeDocument/2006/relationships">
   <c:lang val="en-US"/>
   <c:roundedCorners val="0"/>
@@ -25,9 +25,9 @@
           <c:xMode val="edge"/>
           <c:yMode val="edge"/>
           <c:x val="0"/>
-          <c:y val="0.0614617940199336"/>
-          <c:w val="0.782809192621712"/>
-          <c:h val="0.865669988925803"/>
+          <c:y val="0.0614686011739949"/>
+          <c:w val="0.782717169426174"/>
+          <c:h val="0.865544357071658"/>
         </c:manualLayout>
       </c:layout>
       <c:barChart>
@@ -125,11 +125,11 @@
         </c:ser>
         <c:gapWidth val="100"/>
         <c:overlap val="0"/>
-        <c:axId val="6451580"/>
-        <c:axId val="68653983"/>
+        <c:axId val="94121541"/>
+        <c:axId val="98679859"/>
       </c:barChart>
       <c:catAx>
-        <c:axId val="6451580"/>
+        <c:axId val="94121541"/>
         <c:scaling>
           <c:orientation val="minMax"/>
         </c:scaling>
@@ -161,7 +161,7 @@
             </a:pPr>
           </a:p>
         </c:txPr>
-        <c:crossAx val="68653983"/>
+        <c:crossAx val="98679859"/>
         <c:crosses val="autoZero"/>
         <c:auto val="1"/>
         <c:lblAlgn val="ctr"/>
@@ -169,7 +169,7 @@
         <c:noMultiLvlLbl val="0"/>
       </c:catAx>
       <c:valAx>
-        <c:axId val="68653983"/>
+        <c:axId val="98679859"/>
         <c:scaling>
           <c:orientation val="minMax"/>
         </c:scaling>
@@ -210,7 +210,7 @@
             </a:pPr>
           </a:p>
         </c:txPr>
-        <c:crossAx val="6451580"/>
+        <c:crossAx val="94121541"/>
         <c:crosses val="autoZero"/>
         <c:crossBetween val="between"/>
       </c:valAx>
@@ -301,7 +301,7 @@
       </p:grpSpPr>
       <p:sp>
         <p:nvSpPr>
-          <p:cNvPr id="21" name="PlaceHolder 1"/>
+          <p:cNvPr id="23" name="PlaceHolder 1"/>
           <p:cNvSpPr>
             <a:spLocks noGrp="1"/>
           </p:cNvSpPr>
@@ -336,7 +336,7 @@
       </p:sp>
       <p:sp>
         <p:nvSpPr>
-          <p:cNvPr id="22" name="PlaceHolder 2"/>
+          <p:cNvPr id="24" name="PlaceHolder 2"/>
           <p:cNvSpPr>
             <a:spLocks noGrp="1"/>
           </p:cNvSpPr>
@@ -370,7 +370,7 @@
       </p:sp>
       <p:sp>
         <p:nvSpPr>
-          <p:cNvPr id="23" name="PlaceHolder 3"/>
+          <p:cNvPr id="25" name="PlaceHolder 3"/>
           <p:cNvSpPr>
             <a:spLocks noGrp="1"/>
           </p:cNvSpPr>
@@ -426,7 +426,7 @@
       </p:grpSpPr>
       <p:sp>
         <p:nvSpPr>
-          <p:cNvPr id="24" name="PlaceHolder 1"/>
+          <p:cNvPr id="26" name="PlaceHolder 1"/>
           <p:cNvSpPr>
             <a:spLocks noGrp="1"/>
           </p:cNvSpPr>
@@ -461,7 +461,7 @@
       </p:sp>
       <p:sp>
         <p:nvSpPr>
-          <p:cNvPr id="25" name="PlaceHolder 2"/>
+          <p:cNvPr id="27" name="PlaceHolder 2"/>
           <p:cNvSpPr>
             <a:spLocks noGrp="1"/>
           </p:cNvSpPr>
@@ -495,7 +495,7 @@
       </p:sp>
       <p:sp>
         <p:nvSpPr>
-          <p:cNvPr id="26" name="PlaceHolder 3"/>
+          <p:cNvPr id="28" name="PlaceHolder 3"/>
           <p:cNvSpPr>
             <a:spLocks noGrp="1"/>
           </p:cNvSpPr>
@@ -529,7 +529,7 @@
       </p:sp>
       <p:sp>
         <p:nvSpPr>
-          <p:cNvPr id="27" name="PlaceHolder 4"/>
+          <p:cNvPr id="29" name="PlaceHolder 4"/>
           <p:cNvSpPr>
             <a:spLocks noGrp="1"/>
           </p:cNvSpPr>
@@ -563,7 +563,7 @@
       </p:sp>
       <p:sp>
         <p:nvSpPr>
-          <p:cNvPr id="28" name="PlaceHolder 5"/>
+          <p:cNvPr id="30" name="PlaceHolder 5"/>
           <p:cNvSpPr>
             <a:spLocks noGrp="1"/>
           </p:cNvSpPr>
@@ -619,7 +619,7 @@
       </p:grpSpPr>
       <p:sp>
         <p:nvSpPr>
-          <p:cNvPr id="29" name="PlaceHolder 1"/>
+          <p:cNvPr id="31" name="PlaceHolder 1"/>
           <p:cNvSpPr>
             <a:spLocks noGrp="1"/>
           </p:cNvSpPr>
@@ -654,7 +654,7 @@
       </p:sp>
       <p:sp>
         <p:nvSpPr>
-          <p:cNvPr id="30" name="PlaceHolder 2"/>
+          <p:cNvPr id="32" name="PlaceHolder 2"/>
           <p:cNvSpPr>
             <a:spLocks noGrp="1"/>
           </p:cNvSpPr>
@@ -688,7 +688,7 @@
       </p:sp>
       <p:sp>
         <p:nvSpPr>
-          <p:cNvPr id="31" name="PlaceHolder 3"/>
+          <p:cNvPr id="33" name="PlaceHolder 3"/>
           <p:cNvSpPr>
             <a:spLocks noGrp="1"/>
           </p:cNvSpPr>
@@ -722,7 +722,7 @@
       </p:sp>
       <p:sp>
         <p:nvSpPr>
-          <p:cNvPr id="32" name="PlaceHolder 4"/>
+          <p:cNvPr id="34" name="PlaceHolder 4"/>
           <p:cNvSpPr>
             <a:spLocks noGrp="1"/>
           </p:cNvSpPr>
@@ -756,7 +756,7 @@
       </p:sp>
       <p:sp>
         <p:nvSpPr>
-          <p:cNvPr id="33" name="PlaceHolder 5"/>
+          <p:cNvPr id="35" name="PlaceHolder 5"/>
           <p:cNvSpPr>
             <a:spLocks noGrp="1"/>
           </p:cNvSpPr>
@@ -790,7 +790,7 @@
       </p:sp>
       <p:sp>
         <p:nvSpPr>
-          <p:cNvPr id="34" name="PlaceHolder 6"/>
+          <p:cNvPr id="36" name="PlaceHolder 6"/>
           <p:cNvSpPr>
             <a:spLocks noGrp="1"/>
           </p:cNvSpPr>
@@ -824,7 +824,7 @@
       </p:sp>
       <p:sp>
         <p:nvSpPr>
-          <p:cNvPr id="35" name="PlaceHolder 7"/>
+          <p:cNvPr id="37" name="PlaceHolder 7"/>
           <p:cNvSpPr>
             <a:spLocks noGrp="1"/>
           </p:cNvSpPr>
@@ -864,6 +864,905 @@
 <file path=ppt/slideLayouts/slideLayout2.xml><?xml version="1.0" encoding="utf-8"?>
 <p:sldLayout xmlns:a="http://schemas.openxmlformats.org/drawingml/2006/main" xmlns:p="http://schemas.openxmlformats.org/presentationml/2006/main" xmlns:r="http://schemas.openxmlformats.org/officeDocument/2006/relationships" xmlns:p14="http://schemas.microsoft.com/office/powerpoint/2010/main" xmlns:p15="http://schemas.microsoft.com/office/powerpoint/2012/main" xmlns:mc="http://schemas.openxmlformats.org/markup-compatibility/2006" type="tx" preserve="1">
   <p:cSld name="Title Slide">
+    <p:spTree>
+      <p:nvGrpSpPr>
+        <p:cNvPr id="1" name=""/>
+        <p:cNvGrpSpPr/>
+        <p:nvPr/>
+      </p:nvGrpSpPr>
+      <p:grpSpPr>
+        <a:xfrm>
+          <a:off x="0" y="0"/>
+          <a:ext cx="0" cy="0"/>
+          <a:chOff x="0" y="0"/>
+          <a:chExt cx="0" cy="0"/>
+        </a:xfrm>
+      </p:grpSpPr>
+      <p:sp>
+        <p:nvSpPr>
+          <p:cNvPr id="2" name="PlaceHolder 1"/>
+          <p:cNvSpPr>
+            <a:spLocks noGrp="1"/>
+          </p:cNvSpPr>
+          <p:nvPr>
+            <p:ph type="title"/>
+          </p:nvPr>
+        </p:nvSpPr>
+        <p:spPr>
+          <a:xfrm>
+            <a:off x="504000" y="226080"/>
+            <a:ext cx="9072000" cy="946440"/>
+          </a:xfrm>
+          <a:prstGeom prst="rect">
+            <a:avLst/>
+          </a:prstGeom>
+          <a:noFill/>
+          <a:ln w="0">
+            <a:noFill/>
+          </a:ln>
+        </p:spPr>
+        <p:txBody>
+          <a:bodyPr lIns="0" rIns="0" tIns="0" bIns="0" anchor="ctr">
+            <a:noAutofit/>
+          </a:bodyPr>
+          <a:p>
+            <a:pPr algn="ctr"/>
+            <a:endParaRPr b="0" lang="en-US" sz="4400" spc="-1" strike="noStrike">
+              <a:latin typeface="Arial"/>
+            </a:endParaRPr>
+          </a:p>
+        </p:txBody>
+      </p:sp>
+      <p:sp>
+        <p:nvSpPr>
+          <p:cNvPr id="3" name="PlaceHolder 2"/>
+          <p:cNvSpPr>
+            <a:spLocks noGrp="1"/>
+          </p:cNvSpPr>
+          <p:nvPr>
+            <p:ph type="subTitle"/>
+          </p:nvPr>
+        </p:nvSpPr>
+        <p:spPr>
+          <a:xfrm>
+            <a:off x="504000" y="1326600"/>
+            <a:ext cx="9072000" cy="3288600"/>
+          </a:xfrm>
+          <a:prstGeom prst="rect">
+            <a:avLst/>
+          </a:prstGeom>
+          <a:noFill/>
+          <a:ln w="0">
+            <a:noFill/>
+          </a:ln>
+        </p:spPr>
+        <p:txBody>
+          <a:bodyPr lIns="0" rIns="0" tIns="0" bIns="0" anchor="ctr">
+            <a:noAutofit/>
+          </a:bodyPr>
+          <a:p>
+            <a:pPr algn="ctr"/>
+            <a:endParaRPr b="0" lang="en-US" sz="3200" spc="-1" strike="noStrike">
+              <a:latin typeface="Arial"/>
+            </a:endParaRPr>
+          </a:p>
+        </p:txBody>
+      </p:sp>
+    </p:spTree>
+  </p:cSld>
+</p:sldLayout>
+</file>
+
+<file path=ppt/slideLayouts/slideLayout3.xml><?xml version="1.0" encoding="utf-8"?>
+<p:sldLayout xmlns:a="http://schemas.openxmlformats.org/drawingml/2006/main" xmlns:p="http://schemas.openxmlformats.org/presentationml/2006/main" xmlns:r="http://schemas.openxmlformats.org/officeDocument/2006/relationships" xmlns:p14="http://schemas.microsoft.com/office/powerpoint/2010/main" xmlns:p15="http://schemas.microsoft.com/office/powerpoint/2012/main" xmlns:mc="http://schemas.openxmlformats.org/markup-compatibility/2006" type="obj" preserve="1">
+  <p:cSld name="Title, Content">
+    <p:spTree>
+      <p:nvGrpSpPr>
+        <p:cNvPr id="1" name=""/>
+        <p:cNvGrpSpPr/>
+        <p:nvPr/>
+      </p:nvGrpSpPr>
+      <p:grpSpPr>
+        <a:xfrm>
+          <a:off x="0" y="0"/>
+          <a:ext cx="0" cy="0"/>
+          <a:chOff x="0" y="0"/>
+          <a:chExt cx="0" cy="0"/>
+        </a:xfrm>
+      </p:grpSpPr>
+      <p:sp>
+        <p:nvSpPr>
+          <p:cNvPr id="4" name="PlaceHolder 1"/>
+          <p:cNvSpPr>
+            <a:spLocks noGrp="1"/>
+          </p:cNvSpPr>
+          <p:nvPr>
+            <p:ph type="title"/>
+          </p:nvPr>
+        </p:nvSpPr>
+        <p:spPr>
+          <a:xfrm>
+            <a:off x="504000" y="226080"/>
+            <a:ext cx="9072000" cy="946440"/>
+          </a:xfrm>
+          <a:prstGeom prst="rect">
+            <a:avLst/>
+          </a:prstGeom>
+          <a:noFill/>
+          <a:ln w="0">
+            <a:noFill/>
+          </a:ln>
+        </p:spPr>
+        <p:txBody>
+          <a:bodyPr lIns="0" rIns="0" tIns="0" bIns="0" anchor="ctr">
+            <a:noAutofit/>
+          </a:bodyPr>
+          <a:p>
+            <a:pPr algn="ctr"/>
+            <a:endParaRPr b="0" lang="en-US" sz="4400" spc="-1" strike="noStrike">
+              <a:latin typeface="Arial"/>
+            </a:endParaRPr>
+          </a:p>
+        </p:txBody>
+      </p:sp>
+      <p:sp>
+        <p:nvSpPr>
+          <p:cNvPr id="5" name="PlaceHolder 2"/>
+          <p:cNvSpPr>
+            <a:spLocks noGrp="1"/>
+          </p:cNvSpPr>
+          <p:nvPr>
+            <p:ph/>
+          </p:nvPr>
+        </p:nvSpPr>
+        <p:spPr>
+          <a:xfrm>
+            <a:off x="504000" y="1326600"/>
+            <a:ext cx="9072000" cy="3288600"/>
+          </a:xfrm>
+          <a:prstGeom prst="rect">
+            <a:avLst/>
+          </a:prstGeom>
+          <a:noFill/>
+          <a:ln w="0">
+            <a:noFill/>
+          </a:ln>
+        </p:spPr>
+        <p:txBody>
+          <a:bodyPr lIns="0" rIns="0" tIns="0" bIns="0" anchor="t">
+            <a:normAutofit/>
+          </a:bodyPr>
+          <a:p>
+            <a:endParaRPr b="0" lang="en-US" sz="3200" spc="-1" strike="noStrike">
+              <a:latin typeface="Arial"/>
+            </a:endParaRPr>
+          </a:p>
+        </p:txBody>
+      </p:sp>
+    </p:spTree>
+  </p:cSld>
+</p:sldLayout>
+</file>
+
+<file path=ppt/slideLayouts/slideLayout4.xml><?xml version="1.0" encoding="utf-8"?>
+<p:sldLayout xmlns:a="http://schemas.openxmlformats.org/drawingml/2006/main" xmlns:p="http://schemas.openxmlformats.org/presentationml/2006/main" xmlns:r="http://schemas.openxmlformats.org/officeDocument/2006/relationships" xmlns:p14="http://schemas.microsoft.com/office/powerpoint/2010/main" xmlns:p15="http://schemas.microsoft.com/office/powerpoint/2012/main" xmlns:mc="http://schemas.openxmlformats.org/markup-compatibility/2006" type="twoObj" preserve="1">
+  <p:cSld name="Title, 2 Content">
+    <p:spTree>
+      <p:nvGrpSpPr>
+        <p:cNvPr id="1" name=""/>
+        <p:cNvGrpSpPr/>
+        <p:nvPr/>
+      </p:nvGrpSpPr>
+      <p:grpSpPr>
+        <a:xfrm>
+          <a:off x="0" y="0"/>
+          <a:ext cx="0" cy="0"/>
+          <a:chOff x="0" y="0"/>
+          <a:chExt cx="0" cy="0"/>
+        </a:xfrm>
+      </p:grpSpPr>
+      <p:sp>
+        <p:nvSpPr>
+          <p:cNvPr id="6" name="PlaceHolder 1"/>
+          <p:cNvSpPr>
+            <a:spLocks noGrp="1"/>
+          </p:cNvSpPr>
+          <p:nvPr>
+            <p:ph type="title"/>
+          </p:nvPr>
+        </p:nvSpPr>
+        <p:spPr>
+          <a:xfrm>
+            <a:off x="504000" y="226080"/>
+            <a:ext cx="9072000" cy="946440"/>
+          </a:xfrm>
+          <a:prstGeom prst="rect">
+            <a:avLst/>
+          </a:prstGeom>
+          <a:noFill/>
+          <a:ln w="0">
+            <a:noFill/>
+          </a:ln>
+        </p:spPr>
+        <p:txBody>
+          <a:bodyPr lIns="0" rIns="0" tIns="0" bIns="0" anchor="ctr">
+            <a:noAutofit/>
+          </a:bodyPr>
+          <a:p>
+            <a:pPr algn="ctr"/>
+            <a:endParaRPr b="0" lang="en-US" sz="4400" spc="-1" strike="noStrike">
+              <a:latin typeface="Arial"/>
+            </a:endParaRPr>
+          </a:p>
+        </p:txBody>
+      </p:sp>
+      <p:sp>
+        <p:nvSpPr>
+          <p:cNvPr id="7" name="PlaceHolder 2"/>
+          <p:cNvSpPr>
+            <a:spLocks noGrp="1"/>
+          </p:cNvSpPr>
+          <p:nvPr>
+            <p:ph/>
+          </p:nvPr>
+        </p:nvSpPr>
+        <p:spPr>
+          <a:xfrm>
+            <a:off x="504000" y="1326600"/>
+            <a:ext cx="4426920" cy="3288600"/>
+          </a:xfrm>
+          <a:prstGeom prst="rect">
+            <a:avLst/>
+          </a:prstGeom>
+          <a:noFill/>
+          <a:ln w="0">
+            <a:noFill/>
+          </a:ln>
+        </p:spPr>
+        <p:txBody>
+          <a:bodyPr lIns="0" rIns="0" tIns="0" bIns="0" anchor="t">
+            <a:normAutofit/>
+          </a:bodyPr>
+          <a:p>
+            <a:endParaRPr b="0" lang="en-US" sz="3200" spc="-1" strike="noStrike">
+              <a:latin typeface="Arial"/>
+            </a:endParaRPr>
+          </a:p>
+        </p:txBody>
+      </p:sp>
+      <p:sp>
+        <p:nvSpPr>
+          <p:cNvPr id="8" name="PlaceHolder 3"/>
+          <p:cNvSpPr>
+            <a:spLocks noGrp="1"/>
+          </p:cNvSpPr>
+          <p:nvPr>
+            <p:ph/>
+          </p:nvPr>
+        </p:nvSpPr>
+        <p:spPr>
+          <a:xfrm>
+            <a:off x="5152680" y="1326600"/>
+            <a:ext cx="4426920" cy="3288600"/>
+          </a:xfrm>
+          <a:prstGeom prst="rect">
+            <a:avLst/>
+          </a:prstGeom>
+          <a:noFill/>
+          <a:ln w="0">
+            <a:noFill/>
+          </a:ln>
+        </p:spPr>
+        <p:txBody>
+          <a:bodyPr lIns="0" rIns="0" tIns="0" bIns="0" anchor="t">
+            <a:normAutofit/>
+          </a:bodyPr>
+          <a:p>
+            <a:endParaRPr b="0" lang="en-US" sz="3200" spc="-1" strike="noStrike">
+              <a:latin typeface="Arial"/>
+            </a:endParaRPr>
+          </a:p>
+        </p:txBody>
+      </p:sp>
+    </p:spTree>
+  </p:cSld>
+</p:sldLayout>
+</file>
+
+<file path=ppt/slideLayouts/slideLayout5.xml><?xml version="1.0" encoding="utf-8"?>
+<p:sldLayout xmlns:a="http://schemas.openxmlformats.org/drawingml/2006/main" xmlns:p="http://schemas.openxmlformats.org/presentationml/2006/main" xmlns:r="http://schemas.openxmlformats.org/officeDocument/2006/relationships" xmlns:p14="http://schemas.microsoft.com/office/powerpoint/2010/main" xmlns:p15="http://schemas.microsoft.com/office/powerpoint/2012/main" xmlns:mc="http://schemas.openxmlformats.org/markup-compatibility/2006" type="titleOnly" preserve="1">
+  <p:cSld name="Title Only">
+    <p:spTree>
+      <p:nvGrpSpPr>
+        <p:cNvPr id="1" name=""/>
+        <p:cNvGrpSpPr/>
+        <p:nvPr/>
+      </p:nvGrpSpPr>
+      <p:grpSpPr>
+        <a:xfrm>
+          <a:off x="0" y="0"/>
+          <a:ext cx="0" cy="0"/>
+          <a:chOff x="0" y="0"/>
+          <a:chExt cx="0" cy="0"/>
+        </a:xfrm>
+      </p:grpSpPr>
+      <p:sp>
+        <p:nvSpPr>
+          <p:cNvPr id="9" name="PlaceHolder 1"/>
+          <p:cNvSpPr>
+            <a:spLocks noGrp="1"/>
+          </p:cNvSpPr>
+          <p:nvPr>
+            <p:ph type="title"/>
+          </p:nvPr>
+        </p:nvSpPr>
+        <p:spPr>
+          <a:xfrm>
+            <a:off x="504000" y="226080"/>
+            <a:ext cx="9072000" cy="946440"/>
+          </a:xfrm>
+          <a:prstGeom prst="rect">
+            <a:avLst/>
+          </a:prstGeom>
+          <a:noFill/>
+          <a:ln w="0">
+            <a:noFill/>
+          </a:ln>
+        </p:spPr>
+        <p:txBody>
+          <a:bodyPr lIns="0" rIns="0" tIns="0" bIns="0" anchor="ctr">
+            <a:noAutofit/>
+          </a:bodyPr>
+          <a:p>
+            <a:pPr algn="ctr"/>
+            <a:endParaRPr b="0" lang="en-US" sz="4400" spc="-1" strike="noStrike">
+              <a:latin typeface="Arial"/>
+            </a:endParaRPr>
+          </a:p>
+        </p:txBody>
+      </p:sp>
+    </p:spTree>
+  </p:cSld>
+</p:sldLayout>
+</file>
+
+<file path=ppt/slideLayouts/slideLayout6.xml><?xml version="1.0" encoding="utf-8"?>
+<p:sldLayout xmlns:a="http://schemas.openxmlformats.org/drawingml/2006/main" xmlns:p="http://schemas.openxmlformats.org/presentationml/2006/main" xmlns:r="http://schemas.openxmlformats.org/officeDocument/2006/relationships" xmlns:p14="http://schemas.microsoft.com/office/powerpoint/2010/main" xmlns:p15="http://schemas.microsoft.com/office/powerpoint/2012/main" xmlns:mc="http://schemas.openxmlformats.org/markup-compatibility/2006" type="objOnly" preserve="1">
+  <p:cSld name="Centered Text">
+    <p:spTree>
+      <p:nvGrpSpPr>
+        <p:cNvPr id="1" name=""/>
+        <p:cNvGrpSpPr/>
+        <p:nvPr/>
+      </p:nvGrpSpPr>
+      <p:grpSpPr>
+        <a:xfrm>
+          <a:off x="0" y="0"/>
+          <a:ext cx="0" cy="0"/>
+          <a:chOff x="0" y="0"/>
+          <a:chExt cx="0" cy="0"/>
+        </a:xfrm>
+      </p:grpSpPr>
+      <p:sp>
+        <p:nvSpPr>
+          <p:cNvPr id="10" name="PlaceHolder 1"/>
+          <p:cNvSpPr>
+            <a:spLocks noGrp="1"/>
+          </p:cNvSpPr>
+          <p:nvPr>
+            <p:ph type="subTitle"/>
+          </p:nvPr>
+        </p:nvSpPr>
+        <p:spPr>
+          <a:xfrm>
+            <a:off x="504000" y="226080"/>
+            <a:ext cx="9072000" cy="4388400"/>
+          </a:xfrm>
+          <a:prstGeom prst="rect">
+            <a:avLst/>
+          </a:prstGeom>
+          <a:noFill/>
+          <a:ln w="0">
+            <a:noFill/>
+          </a:ln>
+        </p:spPr>
+        <p:txBody>
+          <a:bodyPr lIns="0" rIns="0" tIns="0" bIns="0" anchor="ctr">
+            <a:noAutofit/>
+          </a:bodyPr>
+          <a:p>
+            <a:pPr algn="ctr"/>
+            <a:endParaRPr b="0" lang="en-US" sz="3200" spc="-1" strike="noStrike">
+              <a:latin typeface="Arial"/>
+            </a:endParaRPr>
+          </a:p>
+        </p:txBody>
+      </p:sp>
+    </p:spTree>
+  </p:cSld>
+</p:sldLayout>
+</file>
+
+<file path=ppt/slideLayouts/slideLayout7.xml><?xml version="1.0" encoding="utf-8"?>
+<p:sldLayout xmlns:a="http://schemas.openxmlformats.org/drawingml/2006/main" xmlns:p="http://schemas.openxmlformats.org/presentationml/2006/main" xmlns:r="http://schemas.openxmlformats.org/officeDocument/2006/relationships" xmlns:p14="http://schemas.microsoft.com/office/powerpoint/2010/main" xmlns:p15="http://schemas.microsoft.com/office/powerpoint/2012/main" xmlns:mc="http://schemas.openxmlformats.org/markup-compatibility/2006" type="twoObjAndObj" preserve="1">
+  <p:cSld name="Title, 2 Content and Content">
+    <p:spTree>
+      <p:nvGrpSpPr>
+        <p:cNvPr id="1" name=""/>
+        <p:cNvGrpSpPr/>
+        <p:nvPr/>
+      </p:nvGrpSpPr>
+      <p:grpSpPr>
+        <a:xfrm>
+          <a:off x="0" y="0"/>
+          <a:ext cx="0" cy="0"/>
+          <a:chOff x="0" y="0"/>
+          <a:chExt cx="0" cy="0"/>
+        </a:xfrm>
+      </p:grpSpPr>
+      <p:sp>
+        <p:nvSpPr>
+          <p:cNvPr id="11" name="PlaceHolder 1"/>
+          <p:cNvSpPr>
+            <a:spLocks noGrp="1"/>
+          </p:cNvSpPr>
+          <p:nvPr>
+            <p:ph type="title"/>
+          </p:nvPr>
+        </p:nvSpPr>
+        <p:spPr>
+          <a:xfrm>
+            <a:off x="504000" y="226080"/>
+            <a:ext cx="9072000" cy="946440"/>
+          </a:xfrm>
+          <a:prstGeom prst="rect">
+            <a:avLst/>
+          </a:prstGeom>
+          <a:noFill/>
+          <a:ln w="0">
+            <a:noFill/>
+          </a:ln>
+        </p:spPr>
+        <p:txBody>
+          <a:bodyPr lIns="0" rIns="0" tIns="0" bIns="0" anchor="ctr">
+            <a:noAutofit/>
+          </a:bodyPr>
+          <a:p>
+            <a:pPr algn="ctr"/>
+            <a:endParaRPr b="0" lang="en-US" sz="4400" spc="-1" strike="noStrike">
+              <a:latin typeface="Arial"/>
+            </a:endParaRPr>
+          </a:p>
+        </p:txBody>
+      </p:sp>
+      <p:sp>
+        <p:nvSpPr>
+          <p:cNvPr id="12" name="PlaceHolder 2"/>
+          <p:cNvSpPr>
+            <a:spLocks noGrp="1"/>
+          </p:cNvSpPr>
+          <p:nvPr>
+            <p:ph/>
+          </p:nvPr>
+        </p:nvSpPr>
+        <p:spPr>
+          <a:xfrm>
+            <a:off x="504000" y="1326600"/>
+            <a:ext cx="4426920" cy="1568520"/>
+          </a:xfrm>
+          <a:prstGeom prst="rect">
+            <a:avLst/>
+          </a:prstGeom>
+          <a:noFill/>
+          <a:ln w="0">
+            <a:noFill/>
+          </a:ln>
+        </p:spPr>
+        <p:txBody>
+          <a:bodyPr lIns="0" rIns="0" tIns="0" bIns="0" anchor="t">
+            <a:normAutofit/>
+          </a:bodyPr>
+          <a:p>
+            <a:endParaRPr b="0" lang="en-US" sz="3200" spc="-1" strike="noStrike">
+              <a:latin typeface="Arial"/>
+            </a:endParaRPr>
+          </a:p>
+        </p:txBody>
+      </p:sp>
+      <p:sp>
+        <p:nvSpPr>
+          <p:cNvPr id="13" name="PlaceHolder 3"/>
+          <p:cNvSpPr>
+            <a:spLocks noGrp="1"/>
+          </p:cNvSpPr>
+          <p:nvPr>
+            <p:ph/>
+          </p:nvPr>
+        </p:nvSpPr>
+        <p:spPr>
+          <a:xfrm>
+            <a:off x="5152680" y="1326600"/>
+            <a:ext cx="4426920" cy="3288600"/>
+          </a:xfrm>
+          <a:prstGeom prst="rect">
+            <a:avLst/>
+          </a:prstGeom>
+          <a:noFill/>
+          <a:ln w="0">
+            <a:noFill/>
+          </a:ln>
+        </p:spPr>
+        <p:txBody>
+          <a:bodyPr lIns="0" rIns="0" tIns="0" bIns="0" anchor="t">
+            <a:normAutofit/>
+          </a:bodyPr>
+          <a:p>
+            <a:endParaRPr b="0" lang="en-US" sz="3200" spc="-1" strike="noStrike">
+              <a:latin typeface="Arial"/>
+            </a:endParaRPr>
+          </a:p>
+        </p:txBody>
+      </p:sp>
+      <p:sp>
+        <p:nvSpPr>
+          <p:cNvPr id="14" name="PlaceHolder 4"/>
+          <p:cNvSpPr>
+            <a:spLocks noGrp="1"/>
+          </p:cNvSpPr>
+          <p:nvPr>
+            <p:ph/>
+          </p:nvPr>
+        </p:nvSpPr>
+        <p:spPr>
+          <a:xfrm>
+            <a:off x="504000" y="3044520"/>
+            <a:ext cx="4426920" cy="1568520"/>
+          </a:xfrm>
+          <a:prstGeom prst="rect">
+            <a:avLst/>
+          </a:prstGeom>
+          <a:noFill/>
+          <a:ln w="0">
+            <a:noFill/>
+          </a:ln>
+        </p:spPr>
+        <p:txBody>
+          <a:bodyPr lIns="0" rIns="0" tIns="0" bIns="0" anchor="t">
+            <a:normAutofit/>
+          </a:bodyPr>
+          <a:p>
+            <a:endParaRPr b="0" lang="en-US" sz="3200" spc="-1" strike="noStrike">
+              <a:latin typeface="Arial"/>
+            </a:endParaRPr>
+          </a:p>
+        </p:txBody>
+      </p:sp>
+    </p:spTree>
+  </p:cSld>
+</p:sldLayout>
+</file>
+
+<file path=ppt/slideLayouts/slideLayout8.xml><?xml version="1.0" encoding="utf-8"?>
+<p:sldLayout xmlns:a="http://schemas.openxmlformats.org/drawingml/2006/main" xmlns:p="http://schemas.openxmlformats.org/presentationml/2006/main" xmlns:r="http://schemas.openxmlformats.org/officeDocument/2006/relationships" xmlns:p14="http://schemas.microsoft.com/office/powerpoint/2010/main" xmlns:p15="http://schemas.microsoft.com/office/powerpoint/2012/main" xmlns:mc="http://schemas.openxmlformats.org/markup-compatibility/2006" type="objAndTwoObj" preserve="1">
+  <p:cSld name="Title Content and 2 Content">
+    <p:spTree>
+      <p:nvGrpSpPr>
+        <p:cNvPr id="1" name=""/>
+        <p:cNvGrpSpPr/>
+        <p:nvPr/>
+      </p:nvGrpSpPr>
+      <p:grpSpPr>
+        <a:xfrm>
+          <a:off x="0" y="0"/>
+          <a:ext cx="0" cy="0"/>
+          <a:chOff x="0" y="0"/>
+          <a:chExt cx="0" cy="0"/>
+        </a:xfrm>
+      </p:grpSpPr>
+      <p:sp>
+        <p:nvSpPr>
+          <p:cNvPr id="15" name="PlaceHolder 1"/>
+          <p:cNvSpPr>
+            <a:spLocks noGrp="1"/>
+          </p:cNvSpPr>
+          <p:nvPr>
+            <p:ph type="title"/>
+          </p:nvPr>
+        </p:nvSpPr>
+        <p:spPr>
+          <a:xfrm>
+            <a:off x="504000" y="226080"/>
+            <a:ext cx="9072000" cy="946440"/>
+          </a:xfrm>
+          <a:prstGeom prst="rect">
+            <a:avLst/>
+          </a:prstGeom>
+          <a:noFill/>
+          <a:ln w="0">
+            <a:noFill/>
+          </a:ln>
+        </p:spPr>
+        <p:txBody>
+          <a:bodyPr lIns="0" rIns="0" tIns="0" bIns="0" anchor="ctr">
+            <a:noAutofit/>
+          </a:bodyPr>
+          <a:p>
+            <a:pPr algn="ctr"/>
+            <a:endParaRPr b="0" lang="en-US" sz="4400" spc="-1" strike="noStrike">
+              <a:latin typeface="Arial"/>
+            </a:endParaRPr>
+          </a:p>
+        </p:txBody>
+      </p:sp>
+      <p:sp>
+        <p:nvSpPr>
+          <p:cNvPr id="16" name="PlaceHolder 2"/>
+          <p:cNvSpPr>
+            <a:spLocks noGrp="1"/>
+          </p:cNvSpPr>
+          <p:nvPr>
+            <p:ph/>
+          </p:nvPr>
+        </p:nvSpPr>
+        <p:spPr>
+          <a:xfrm>
+            <a:off x="504000" y="1326600"/>
+            <a:ext cx="4426920" cy="3288600"/>
+          </a:xfrm>
+          <a:prstGeom prst="rect">
+            <a:avLst/>
+          </a:prstGeom>
+          <a:noFill/>
+          <a:ln w="0">
+            <a:noFill/>
+          </a:ln>
+        </p:spPr>
+        <p:txBody>
+          <a:bodyPr lIns="0" rIns="0" tIns="0" bIns="0" anchor="t">
+            <a:normAutofit/>
+          </a:bodyPr>
+          <a:p>
+            <a:endParaRPr b="0" lang="en-US" sz="3200" spc="-1" strike="noStrike">
+              <a:latin typeface="Arial"/>
+            </a:endParaRPr>
+          </a:p>
+        </p:txBody>
+      </p:sp>
+      <p:sp>
+        <p:nvSpPr>
+          <p:cNvPr id="17" name="PlaceHolder 3"/>
+          <p:cNvSpPr>
+            <a:spLocks noGrp="1"/>
+          </p:cNvSpPr>
+          <p:nvPr>
+            <p:ph/>
+          </p:nvPr>
+        </p:nvSpPr>
+        <p:spPr>
+          <a:xfrm>
+            <a:off x="5152680" y="1326600"/>
+            <a:ext cx="4426920" cy="1568520"/>
+          </a:xfrm>
+          <a:prstGeom prst="rect">
+            <a:avLst/>
+          </a:prstGeom>
+          <a:noFill/>
+          <a:ln w="0">
+            <a:noFill/>
+          </a:ln>
+        </p:spPr>
+        <p:txBody>
+          <a:bodyPr lIns="0" rIns="0" tIns="0" bIns="0" anchor="t">
+            <a:normAutofit/>
+          </a:bodyPr>
+          <a:p>
+            <a:endParaRPr b="0" lang="en-US" sz="3200" spc="-1" strike="noStrike">
+              <a:latin typeface="Arial"/>
+            </a:endParaRPr>
+          </a:p>
+        </p:txBody>
+      </p:sp>
+      <p:sp>
+        <p:nvSpPr>
+          <p:cNvPr id="18" name="PlaceHolder 4"/>
+          <p:cNvSpPr>
+            <a:spLocks noGrp="1"/>
+          </p:cNvSpPr>
+          <p:nvPr>
+            <p:ph/>
+          </p:nvPr>
+        </p:nvSpPr>
+        <p:spPr>
+          <a:xfrm>
+            <a:off x="5152680" y="3044520"/>
+            <a:ext cx="4426920" cy="1568520"/>
+          </a:xfrm>
+          <a:prstGeom prst="rect">
+            <a:avLst/>
+          </a:prstGeom>
+          <a:noFill/>
+          <a:ln w="0">
+            <a:noFill/>
+          </a:ln>
+        </p:spPr>
+        <p:txBody>
+          <a:bodyPr lIns="0" rIns="0" tIns="0" bIns="0" anchor="t">
+            <a:normAutofit/>
+          </a:bodyPr>
+          <a:p>
+            <a:endParaRPr b="0" lang="en-US" sz="3200" spc="-1" strike="noStrike">
+              <a:latin typeface="Arial"/>
+            </a:endParaRPr>
+          </a:p>
+        </p:txBody>
+      </p:sp>
+    </p:spTree>
+  </p:cSld>
+</p:sldLayout>
+</file>
+
+<file path=ppt/slideLayouts/slideLayout9.xml><?xml version="1.0" encoding="utf-8"?>
+<p:sldLayout xmlns:a="http://schemas.openxmlformats.org/drawingml/2006/main" xmlns:p="http://schemas.openxmlformats.org/presentationml/2006/main" xmlns:r="http://schemas.openxmlformats.org/officeDocument/2006/relationships" xmlns:p14="http://schemas.microsoft.com/office/powerpoint/2010/main" xmlns:p15="http://schemas.microsoft.com/office/powerpoint/2012/main" xmlns:mc="http://schemas.openxmlformats.org/markup-compatibility/2006" type="twoObjOverTx" preserve="1">
+  <p:cSld name="Title, 2 Content over Content">
+    <p:spTree>
+      <p:nvGrpSpPr>
+        <p:cNvPr id="1" name=""/>
+        <p:cNvGrpSpPr/>
+        <p:nvPr/>
+      </p:nvGrpSpPr>
+      <p:grpSpPr>
+        <a:xfrm>
+          <a:off x="0" y="0"/>
+          <a:ext cx="0" cy="0"/>
+          <a:chOff x="0" y="0"/>
+          <a:chExt cx="0" cy="0"/>
+        </a:xfrm>
+      </p:grpSpPr>
+      <p:sp>
+        <p:nvSpPr>
+          <p:cNvPr id="19" name="PlaceHolder 1"/>
+          <p:cNvSpPr>
+            <a:spLocks noGrp="1"/>
+          </p:cNvSpPr>
+          <p:nvPr>
+            <p:ph type="title"/>
+          </p:nvPr>
+        </p:nvSpPr>
+        <p:spPr>
+          <a:xfrm>
+            <a:off x="504000" y="226080"/>
+            <a:ext cx="9072000" cy="946440"/>
+          </a:xfrm>
+          <a:prstGeom prst="rect">
+            <a:avLst/>
+          </a:prstGeom>
+          <a:noFill/>
+          <a:ln w="0">
+            <a:noFill/>
+          </a:ln>
+        </p:spPr>
+        <p:txBody>
+          <a:bodyPr lIns="0" rIns="0" tIns="0" bIns="0" anchor="ctr">
+            <a:noAutofit/>
+          </a:bodyPr>
+          <a:p>
+            <a:pPr algn="ctr"/>
+            <a:endParaRPr b="0" lang="en-US" sz="4400" spc="-1" strike="noStrike">
+              <a:latin typeface="Arial"/>
+            </a:endParaRPr>
+          </a:p>
+        </p:txBody>
+      </p:sp>
+      <p:sp>
+        <p:nvSpPr>
+          <p:cNvPr id="20" name="PlaceHolder 2"/>
+          <p:cNvSpPr>
+            <a:spLocks noGrp="1"/>
+          </p:cNvSpPr>
+          <p:nvPr>
+            <p:ph/>
+          </p:nvPr>
+        </p:nvSpPr>
+        <p:spPr>
+          <a:xfrm>
+            <a:off x="504000" y="1326600"/>
+            <a:ext cx="4426920" cy="1568520"/>
+          </a:xfrm>
+          <a:prstGeom prst="rect">
+            <a:avLst/>
+          </a:prstGeom>
+          <a:noFill/>
+          <a:ln w="0">
+            <a:noFill/>
+          </a:ln>
+        </p:spPr>
+        <p:txBody>
+          <a:bodyPr lIns="0" rIns="0" tIns="0" bIns="0" anchor="t">
+            <a:normAutofit/>
+          </a:bodyPr>
+          <a:p>
+            <a:endParaRPr b="0" lang="en-US" sz="3200" spc="-1" strike="noStrike">
+              <a:latin typeface="Arial"/>
+            </a:endParaRPr>
+          </a:p>
+        </p:txBody>
+      </p:sp>
+      <p:sp>
+        <p:nvSpPr>
+          <p:cNvPr id="21" name="PlaceHolder 3"/>
+          <p:cNvSpPr>
+            <a:spLocks noGrp="1"/>
+          </p:cNvSpPr>
+          <p:nvPr>
+            <p:ph/>
+          </p:nvPr>
+        </p:nvSpPr>
+        <p:spPr>
+          <a:xfrm>
+            <a:off x="5152680" y="1326600"/>
+            <a:ext cx="4426920" cy="1568520"/>
+          </a:xfrm>
+          <a:prstGeom prst="rect">
+            <a:avLst/>
+          </a:prstGeom>
+          <a:noFill/>
+          <a:ln w="0">
+            <a:noFill/>
+          </a:ln>
+        </p:spPr>
+        <p:txBody>
+          <a:bodyPr lIns="0" rIns="0" tIns="0" bIns="0" anchor="t">
+            <a:normAutofit/>
+          </a:bodyPr>
+          <a:p>
+            <a:endParaRPr b="0" lang="en-US" sz="3200" spc="-1" strike="noStrike">
+              <a:latin typeface="Arial"/>
+            </a:endParaRPr>
+          </a:p>
+        </p:txBody>
+      </p:sp>
+      <p:sp>
+        <p:nvSpPr>
+          <p:cNvPr id="22" name="PlaceHolder 4"/>
+          <p:cNvSpPr>
+            <a:spLocks noGrp="1"/>
+          </p:cNvSpPr>
+          <p:nvPr>
+            <p:ph/>
+          </p:nvPr>
+        </p:nvSpPr>
+        <p:spPr>
+          <a:xfrm>
+            <a:off x="504000" y="3044520"/>
+            <a:ext cx="9072000" cy="1568520"/>
+          </a:xfrm>
+          <a:prstGeom prst="rect">
+            <a:avLst/>
+          </a:prstGeom>
+          <a:noFill/>
+          <a:ln w="0">
+            <a:noFill/>
+          </a:ln>
+        </p:spPr>
+        <p:txBody>
+          <a:bodyPr lIns="0" rIns="0" tIns="0" bIns="0" anchor="t">
+            <a:normAutofit/>
+          </a:bodyPr>
+          <a:p>
+            <a:endParaRPr b="0" lang="en-US" sz="3200" spc="-1" strike="noStrike">
+              <a:latin typeface="Arial"/>
+            </a:endParaRPr>
+          </a:p>
+        </p:txBody>
+      </p:sp>
+    </p:spTree>
+  </p:cSld>
+</p:sldLayout>
+</file>
+
+<file path=ppt/slideMasters/slideMaster1.xml><?xml version="1.0" encoding="utf-8"?>
+<p:sldMaster xmlns:a="http://schemas.openxmlformats.org/drawingml/2006/main" xmlns:p="http://schemas.openxmlformats.org/presentationml/2006/main" xmlns:r="http://schemas.openxmlformats.org/officeDocument/2006/relationships" xmlns:p14="http://schemas.microsoft.com/office/powerpoint/2010/main" xmlns:p15="http://schemas.microsoft.com/office/powerpoint/2012/main" xmlns:mc="http://schemas.openxmlformats.org/markup-compatibility/2006">
+  <p:cSld>
     <p:spTree>
       <p:nvGrpSpPr>
         <p:cNvPr id="1" name=""/>
@@ -907,6 +1806,12 @@
           </a:bodyPr>
           <a:p>
             <a:pPr algn="ctr"/>
+            <a:r>
+              <a:rPr b="0" lang="en-US" sz="4400" spc="-1" strike="noStrike">
+                <a:latin typeface="Arial"/>
+              </a:rPr>
+              <a:t>Click to edit the title text format</a:t>
+            </a:r>
             <a:endParaRPr b="0" lang="en-US" sz="4400" spc="-1" strike="noStrike">
               <a:latin typeface="Arial"/>
             </a:endParaRPr>
@@ -920,7 +1825,7 @@
             <a:spLocks noGrp="1"/>
           </p:cNvSpPr>
           <p:nvPr>
-            <p:ph type="subTitle"/>
+            <p:ph type="body"/>
           </p:nvPr>
         </p:nvSpPr>
         <p:spPr>
@@ -937,846 +1842,165 @@
           </a:ln>
         </p:spPr>
         <p:txBody>
-          <a:bodyPr lIns="0" rIns="0" tIns="0" bIns="0" anchor="ctr">
-            <a:noAutofit/>
-          </a:bodyPr>
-          <a:p>
-            <a:pPr algn="ctr"/>
-            <a:endParaRPr b="0" lang="en-US" sz="3200" spc="-1" strike="noStrike">
-              <a:latin typeface="Arial"/>
-            </a:endParaRPr>
-          </a:p>
-        </p:txBody>
-      </p:sp>
-    </p:spTree>
-  </p:cSld>
-</p:sldLayout>
-</file>
-
-<file path=ppt/slideLayouts/slideLayout3.xml><?xml version="1.0" encoding="utf-8"?>
-<p:sldLayout xmlns:a="http://schemas.openxmlformats.org/drawingml/2006/main" xmlns:p="http://schemas.openxmlformats.org/presentationml/2006/main" xmlns:r="http://schemas.openxmlformats.org/officeDocument/2006/relationships" xmlns:p14="http://schemas.microsoft.com/office/powerpoint/2010/main" xmlns:p15="http://schemas.microsoft.com/office/powerpoint/2012/main" xmlns:mc="http://schemas.openxmlformats.org/markup-compatibility/2006" type="obj" preserve="1">
-  <p:cSld name="Title, Content">
-    <p:spTree>
-      <p:nvGrpSpPr>
-        <p:cNvPr id="1" name=""/>
-        <p:cNvGrpSpPr/>
-        <p:nvPr/>
-      </p:nvGrpSpPr>
-      <p:grpSpPr>
-        <a:xfrm>
-          <a:off x="0" y="0"/>
-          <a:ext cx="0" cy="0"/>
-          <a:chOff x="0" y="0"/>
-          <a:chExt cx="0" cy="0"/>
-        </a:xfrm>
-      </p:grpSpPr>
-      <p:sp>
-        <p:nvSpPr>
-          <p:cNvPr id="2" name="PlaceHolder 1"/>
-          <p:cNvSpPr>
-            <a:spLocks noGrp="1"/>
-          </p:cNvSpPr>
-          <p:nvPr>
-            <p:ph type="title"/>
-          </p:nvPr>
-        </p:nvSpPr>
-        <p:spPr>
-          <a:xfrm>
-            <a:off x="504000" y="226080"/>
-            <a:ext cx="9072000" cy="946440"/>
-          </a:xfrm>
-          <a:prstGeom prst="rect">
-            <a:avLst/>
-          </a:prstGeom>
-          <a:noFill/>
-          <a:ln w="0">
-            <a:noFill/>
-          </a:ln>
-        </p:spPr>
-        <p:txBody>
-          <a:bodyPr lIns="0" rIns="0" tIns="0" bIns="0" anchor="ctr">
-            <a:noAutofit/>
-          </a:bodyPr>
-          <a:p>
-            <a:pPr algn="ctr"/>
-            <a:endParaRPr b="0" lang="en-US" sz="4400" spc="-1" strike="noStrike">
-              <a:latin typeface="Arial"/>
-            </a:endParaRPr>
-          </a:p>
-        </p:txBody>
-      </p:sp>
-      <p:sp>
-        <p:nvSpPr>
-          <p:cNvPr id="3" name="PlaceHolder 2"/>
-          <p:cNvSpPr>
-            <a:spLocks noGrp="1"/>
-          </p:cNvSpPr>
-          <p:nvPr>
-            <p:ph/>
-          </p:nvPr>
-        </p:nvSpPr>
-        <p:spPr>
-          <a:xfrm>
-            <a:off x="504000" y="1326600"/>
-            <a:ext cx="9072000" cy="3288600"/>
-          </a:xfrm>
-          <a:prstGeom prst="rect">
-            <a:avLst/>
-          </a:prstGeom>
-          <a:noFill/>
-          <a:ln w="0">
-            <a:noFill/>
-          </a:ln>
-        </p:spPr>
-        <p:txBody>
           <a:bodyPr lIns="0" rIns="0" tIns="0" bIns="0" anchor="t">
             <a:normAutofit/>
           </a:bodyPr>
           <a:p>
+            <a:pPr marL="432000" indent="-324000">
+              <a:spcBef>
+                <a:spcPts val="1417"/>
+              </a:spcBef>
+              <a:buClr>
+                <a:srgbClr val="000000"/>
+              </a:buClr>
+              <a:buSzPct val="45000"/>
+              <a:buFont typeface="Wingdings" charset="2"/>
+              <a:buChar char=""/>
+            </a:pPr>
+            <a:r>
+              <a:rPr b="0" lang="en-US" sz="3200" spc="-1" strike="noStrike">
+                <a:latin typeface="Arial"/>
+              </a:rPr>
+              <a:t>Click to edit the outline text format</a:t>
+            </a:r>
             <a:endParaRPr b="0" lang="en-US" sz="3200" spc="-1" strike="noStrike">
+              <a:latin typeface="Arial"/>
+            </a:endParaRPr>
+          </a:p>
+          <a:p>
+            <a:pPr lvl="1" marL="864000" indent="-324000">
+              <a:spcBef>
+                <a:spcPts val="1134"/>
+              </a:spcBef>
+              <a:buClr>
+                <a:srgbClr val="000000"/>
+              </a:buClr>
+              <a:buSzPct val="75000"/>
+              <a:buFont typeface="Symbol" charset="2"/>
+              <a:buChar char=""/>
+            </a:pPr>
+            <a:r>
+              <a:rPr b="0" lang="en-US" sz="2800" spc="-1" strike="noStrike">
+                <a:latin typeface="Arial"/>
+              </a:rPr>
+              <a:t>Second Outline Level</a:t>
+            </a:r>
+            <a:endParaRPr b="0" lang="en-US" sz="2800" spc="-1" strike="noStrike">
+              <a:latin typeface="Arial"/>
+            </a:endParaRPr>
+          </a:p>
+          <a:p>
+            <a:pPr lvl="2" marL="1296000" indent="-288000">
+              <a:spcBef>
+                <a:spcPts val="850"/>
+              </a:spcBef>
+              <a:buClr>
+                <a:srgbClr val="000000"/>
+              </a:buClr>
+              <a:buSzPct val="45000"/>
+              <a:buFont typeface="Wingdings" charset="2"/>
+              <a:buChar char=""/>
+            </a:pPr>
+            <a:r>
+              <a:rPr b="0" lang="en-US" sz="2400" spc="-1" strike="noStrike">
+                <a:latin typeface="Arial"/>
+              </a:rPr>
+              <a:t>Third Outline Level</a:t>
+            </a:r>
+            <a:endParaRPr b="0" lang="en-US" sz="2400" spc="-1" strike="noStrike">
+              <a:latin typeface="Arial"/>
+            </a:endParaRPr>
+          </a:p>
+          <a:p>
+            <a:pPr lvl="3" marL="1728000" indent="-216000">
+              <a:spcBef>
+                <a:spcPts val="567"/>
+              </a:spcBef>
+              <a:buClr>
+                <a:srgbClr val="000000"/>
+              </a:buClr>
+              <a:buSzPct val="75000"/>
+              <a:buFont typeface="Symbol" charset="2"/>
+              <a:buChar char=""/>
+            </a:pPr>
+            <a:r>
+              <a:rPr b="0" lang="en-US" sz="2000" spc="-1" strike="noStrike">
+                <a:latin typeface="Arial"/>
+              </a:rPr>
+              <a:t>Fourth Outline Level</a:t>
+            </a:r>
+            <a:endParaRPr b="0" lang="en-US" sz="2000" spc="-1" strike="noStrike">
+              <a:latin typeface="Arial"/>
+            </a:endParaRPr>
+          </a:p>
+          <a:p>
+            <a:pPr lvl="4" marL="2160000" indent="-216000">
+              <a:spcBef>
+                <a:spcPts val="283"/>
+              </a:spcBef>
+              <a:buClr>
+                <a:srgbClr val="000000"/>
+              </a:buClr>
+              <a:buSzPct val="45000"/>
+              <a:buFont typeface="Wingdings" charset="2"/>
+              <a:buChar char=""/>
+            </a:pPr>
+            <a:r>
+              <a:rPr b="0" lang="en-US" sz="2000" spc="-1" strike="noStrike">
+                <a:latin typeface="Arial"/>
+              </a:rPr>
+              <a:t>Fifth Outline Level</a:t>
+            </a:r>
+            <a:endParaRPr b="0" lang="en-US" sz="2000" spc="-1" strike="noStrike">
+              <a:latin typeface="Arial"/>
+            </a:endParaRPr>
+          </a:p>
+          <a:p>
+            <a:pPr lvl="5" marL="2592000" indent="-216000">
+              <a:spcBef>
+                <a:spcPts val="283"/>
+              </a:spcBef>
+              <a:buClr>
+                <a:srgbClr val="000000"/>
+              </a:buClr>
+              <a:buSzPct val="45000"/>
+              <a:buFont typeface="Wingdings" charset="2"/>
+              <a:buChar char=""/>
+            </a:pPr>
+            <a:r>
+              <a:rPr b="0" lang="en-US" sz="2000" spc="-1" strike="noStrike">
+                <a:latin typeface="Arial"/>
+              </a:rPr>
+              <a:t>Sixth Outline Level</a:t>
+            </a:r>
+            <a:endParaRPr b="0" lang="en-US" sz="2000" spc="-1" strike="noStrike">
+              <a:latin typeface="Arial"/>
+            </a:endParaRPr>
+          </a:p>
+          <a:p>
+            <a:pPr lvl="6" marL="3024000" indent="-216000">
+              <a:spcBef>
+                <a:spcPts val="283"/>
+              </a:spcBef>
+              <a:buClr>
+                <a:srgbClr val="000000"/>
+              </a:buClr>
+              <a:buSzPct val="45000"/>
+              <a:buFont typeface="Wingdings" charset="2"/>
+              <a:buChar char=""/>
+            </a:pPr>
+            <a:r>
+              <a:rPr b="0" lang="en-US" sz="2000" spc="-1" strike="noStrike">
+                <a:latin typeface="Arial"/>
+              </a:rPr>
+              <a:t>Seventh Outline Level</a:t>
+            </a:r>
+            <a:endParaRPr b="0" lang="en-US" sz="2000" spc="-1" strike="noStrike">
               <a:latin typeface="Arial"/>
             </a:endParaRPr>
           </a:p>
         </p:txBody>
       </p:sp>
-    </p:spTree>
-  </p:cSld>
-</p:sldLayout>
-</file>
-
-<file path=ppt/slideLayouts/slideLayout4.xml><?xml version="1.0" encoding="utf-8"?>
-<p:sldLayout xmlns:a="http://schemas.openxmlformats.org/drawingml/2006/main" xmlns:p="http://schemas.openxmlformats.org/presentationml/2006/main" xmlns:r="http://schemas.openxmlformats.org/officeDocument/2006/relationships" xmlns:p14="http://schemas.microsoft.com/office/powerpoint/2010/main" xmlns:p15="http://schemas.microsoft.com/office/powerpoint/2012/main" xmlns:mc="http://schemas.openxmlformats.org/markup-compatibility/2006" type="twoObj" preserve="1">
-  <p:cSld name="Title, 2 Content">
-    <p:spTree>
-      <p:nvGrpSpPr>
-        <p:cNvPr id="1" name=""/>
-        <p:cNvGrpSpPr/>
-        <p:nvPr/>
-      </p:nvGrpSpPr>
-      <p:grpSpPr>
-        <a:xfrm>
-          <a:off x="0" y="0"/>
-          <a:ext cx="0" cy="0"/>
-          <a:chOff x="0" y="0"/>
-          <a:chExt cx="0" cy="0"/>
-        </a:xfrm>
-      </p:grpSpPr>
-      <p:sp>
-        <p:nvSpPr>
-          <p:cNvPr id="4" name="PlaceHolder 1"/>
-          <p:cNvSpPr>
-            <a:spLocks noGrp="1"/>
-          </p:cNvSpPr>
-          <p:nvPr>
-            <p:ph type="title"/>
-          </p:nvPr>
-        </p:nvSpPr>
-        <p:spPr>
-          <a:xfrm>
-            <a:off x="504000" y="226080"/>
-            <a:ext cx="9072000" cy="946440"/>
-          </a:xfrm>
-          <a:prstGeom prst="rect">
-            <a:avLst/>
-          </a:prstGeom>
-          <a:noFill/>
-          <a:ln w="0">
-            <a:noFill/>
-          </a:ln>
-        </p:spPr>
-        <p:txBody>
-          <a:bodyPr lIns="0" rIns="0" tIns="0" bIns="0" anchor="ctr">
-            <a:noAutofit/>
-          </a:bodyPr>
-          <a:p>
-            <a:pPr algn="ctr"/>
-            <a:endParaRPr b="0" lang="en-US" sz="4400" spc="-1" strike="noStrike">
-              <a:latin typeface="Arial"/>
-            </a:endParaRPr>
-          </a:p>
-        </p:txBody>
-      </p:sp>
-      <p:sp>
-        <p:nvSpPr>
-          <p:cNvPr id="5" name="PlaceHolder 2"/>
-          <p:cNvSpPr>
-            <a:spLocks noGrp="1"/>
-          </p:cNvSpPr>
-          <p:nvPr>
-            <p:ph/>
-          </p:nvPr>
-        </p:nvSpPr>
-        <p:spPr>
-          <a:xfrm>
-            <a:off x="504000" y="1326600"/>
-            <a:ext cx="4426920" cy="3288600"/>
-          </a:xfrm>
-          <a:prstGeom prst="rect">
-            <a:avLst/>
-          </a:prstGeom>
-          <a:noFill/>
-          <a:ln w="0">
-            <a:noFill/>
-          </a:ln>
-        </p:spPr>
-        <p:txBody>
-          <a:bodyPr lIns="0" rIns="0" tIns="0" bIns="0" anchor="t">
-            <a:normAutofit/>
-          </a:bodyPr>
-          <a:p>
-            <a:endParaRPr b="0" lang="en-US" sz="3200" spc="-1" strike="noStrike">
-              <a:latin typeface="Arial"/>
-            </a:endParaRPr>
-          </a:p>
-        </p:txBody>
-      </p:sp>
-      <p:sp>
-        <p:nvSpPr>
-          <p:cNvPr id="6" name="PlaceHolder 3"/>
-          <p:cNvSpPr>
-            <a:spLocks noGrp="1"/>
-          </p:cNvSpPr>
-          <p:nvPr>
-            <p:ph/>
-          </p:nvPr>
-        </p:nvSpPr>
-        <p:spPr>
-          <a:xfrm>
-            <a:off x="5152680" y="1326600"/>
-            <a:ext cx="4426920" cy="3288600"/>
-          </a:xfrm>
-          <a:prstGeom prst="rect">
-            <a:avLst/>
-          </a:prstGeom>
-          <a:noFill/>
-          <a:ln w="0">
-            <a:noFill/>
-          </a:ln>
-        </p:spPr>
-        <p:txBody>
-          <a:bodyPr lIns="0" rIns="0" tIns="0" bIns="0" anchor="t">
-            <a:normAutofit/>
-          </a:bodyPr>
-          <a:p>
-            <a:endParaRPr b="0" lang="en-US" sz="3200" spc="-1" strike="noStrike">
-              <a:latin typeface="Arial"/>
-            </a:endParaRPr>
-          </a:p>
-        </p:txBody>
-      </p:sp>
-    </p:spTree>
-  </p:cSld>
-</p:sldLayout>
-</file>
-
-<file path=ppt/slideLayouts/slideLayout5.xml><?xml version="1.0" encoding="utf-8"?>
-<p:sldLayout xmlns:a="http://schemas.openxmlformats.org/drawingml/2006/main" xmlns:p="http://schemas.openxmlformats.org/presentationml/2006/main" xmlns:r="http://schemas.openxmlformats.org/officeDocument/2006/relationships" xmlns:p14="http://schemas.microsoft.com/office/powerpoint/2010/main" xmlns:p15="http://schemas.microsoft.com/office/powerpoint/2012/main" xmlns:mc="http://schemas.openxmlformats.org/markup-compatibility/2006" type="titleOnly" preserve="1">
-  <p:cSld name="Title Only">
-    <p:spTree>
-      <p:nvGrpSpPr>
-        <p:cNvPr id="1" name=""/>
-        <p:cNvGrpSpPr/>
-        <p:nvPr/>
-      </p:nvGrpSpPr>
-      <p:grpSpPr>
-        <a:xfrm>
-          <a:off x="0" y="0"/>
-          <a:ext cx="0" cy="0"/>
-          <a:chOff x="0" y="0"/>
-          <a:chExt cx="0" cy="0"/>
-        </a:xfrm>
-      </p:grpSpPr>
-      <p:sp>
-        <p:nvSpPr>
-          <p:cNvPr id="7" name="PlaceHolder 1"/>
-          <p:cNvSpPr>
-            <a:spLocks noGrp="1"/>
-          </p:cNvSpPr>
-          <p:nvPr>
-            <p:ph type="title"/>
-          </p:nvPr>
-        </p:nvSpPr>
-        <p:spPr>
-          <a:xfrm>
-            <a:off x="504000" y="226080"/>
-            <a:ext cx="9072000" cy="946440"/>
-          </a:xfrm>
-          <a:prstGeom prst="rect">
-            <a:avLst/>
-          </a:prstGeom>
-          <a:noFill/>
-          <a:ln w="0">
-            <a:noFill/>
-          </a:ln>
-        </p:spPr>
-        <p:txBody>
-          <a:bodyPr lIns="0" rIns="0" tIns="0" bIns="0" anchor="ctr">
-            <a:noAutofit/>
-          </a:bodyPr>
-          <a:p>
-            <a:pPr algn="ctr"/>
-            <a:endParaRPr b="0" lang="en-US" sz="4400" spc="-1" strike="noStrike">
-              <a:latin typeface="Arial"/>
-            </a:endParaRPr>
-          </a:p>
-        </p:txBody>
-      </p:sp>
-    </p:spTree>
-  </p:cSld>
-</p:sldLayout>
-</file>
-
-<file path=ppt/slideLayouts/slideLayout6.xml><?xml version="1.0" encoding="utf-8"?>
-<p:sldLayout xmlns:a="http://schemas.openxmlformats.org/drawingml/2006/main" xmlns:p="http://schemas.openxmlformats.org/presentationml/2006/main" xmlns:r="http://schemas.openxmlformats.org/officeDocument/2006/relationships" xmlns:p14="http://schemas.microsoft.com/office/powerpoint/2010/main" xmlns:p15="http://schemas.microsoft.com/office/powerpoint/2012/main" xmlns:mc="http://schemas.openxmlformats.org/markup-compatibility/2006" type="objOnly" preserve="1">
-  <p:cSld name="Centered Text">
-    <p:spTree>
-      <p:nvGrpSpPr>
-        <p:cNvPr id="1" name=""/>
-        <p:cNvGrpSpPr/>
-        <p:nvPr/>
-      </p:nvGrpSpPr>
-      <p:grpSpPr>
-        <a:xfrm>
-          <a:off x="0" y="0"/>
-          <a:ext cx="0" cy="0"/>
-          <a:chOff x="0" y="0"/>
-          <a:chExt cx="0" cy="0"/>
-        </a:xfrm>
-      </p:grpSpPr>
-      <p:sp>
-        <p:nvSpPr>
-          <p:cNvPr id="8" name="PlaceHolder 1"/>
-          <p:cNvSpPr>
-            <a:spLocks noGrp="1"/>
-          </p:cNvSpPr>
-          <p:nvPr>
-            <p:ph type="subTitle"/>
-          </p:nvPr>
-        </p:nvSpPr>
-        <p:spPr>
-          <a:xfrm>
-            <a:off x="504000" y="226080"/>
-            <a:ext cx="9072000" cy="4388400"/>
-          </a:xfrm>
-          <a:prstGeom prst="rect">
-            <a:avLst/>
-          </a:prstGeom>
-          <a:noFill/>
-          <a:ln w="0">
-            <a:noFill/>
-          </a:ln>
-        </p:spPr>
-        <p:txBody>
-          <a:bodyPr lIns="0" rIns="0" tIns="0" bIns="0" anchor="ctr">
-            <a:noAutofit/>
-          </a:bodyPr>
-          <a:p>
-            <a:pPr algn="ctr"/>
-            <a:endParaRPr b="0" lang="en-US" sz="3200" spc="-1" strike="noStrike">
-              <a:latin typeface="Arial"/>
-            </a:endParaRPr>
-          </a:p>
-        </p:txBody>
-      </p:sp>
-    </p:spTree>
-  </p:cSld>
-</p:sldLayout>
-</file>
-
-<file path=ppt/slideLayouts/slideLayout7.xml><?xml version="1.0" encoding="utf-8"?>
-<p:sldLayout xmlns:a="http://schemas.openxmlformats.org/drawingml/2006/main" xmlns:p="http://schemas.openxmlformats.org/presentationml/2006/main" xmlns:r="http://schemas.openxmlformats.org/officeDocument/2006/relationships" xmlns:p14="http://schemas.microsoft.com/office/powerpoint/2010/main" xmlns:p15="http://schemas.microsoft.com/office/powerpoint/2012/main" xmlns:mc="http://schemas.openxmlformats.org/markup-compatibility/2006" type="twoObjAndObj" preserve="1">
-  <p:cSld name="Title, 2 Content and Content">
-    <p:spTree>
-      <p:nvGrpSpPr>
-        <p:cNvPr id="1" name=""/>
-        <p:cNvGrpSpPr/>
-        <p:nvPr/>
-      </p:nvGrpSpPr>
-      <p:grpSpPr>
-        <a:xfrm>
-          <a:off x="0" y="0"/>
-          <a:ext cx="0" cy="0"/>
-          <a:chOff x="0" y="0"/>
-          <a:chExt cx="0" cy="0"/>
-        </a:xfrm>
-      </p:grpSpPr>
-      <p:sp>
-        <p:nvSpPr>
-          <p:cNvPr id="9" name="PlaceHolder 1"/>
-          <p:cNvSpPr>
-            <a:spLocks noGrp="1"/>
-          </p:cNvSpPr>
-          <p:nvPr>
-            <p:ph type="title"/>
-          </p:nvPr>
-        </p:nvSpPr>
-        <p:spPr>
-          <a:xfrm>
-            <a:off x="504000" y="226080"/>
-            <a:ext cx="9072000" cy="946440"/>
-          </a:xfrm>
-          <a:prstGeom prst="rect">
-            <a:avLst/>
-          </a:prstGeom>
-          <a:noFill/>
-          <a:ln w="0">
-            <a:noFill/>
-          </a:ln>
-        </p:spPr>
-        <p:txBody>
-          <a:bodyPr lIns="0" rIns="0" tIns="0" bIns="0" anchor="ctr">
-            <a:noAutofit/>
-          </a:bodyPr>
-          <a:p>
-            <a:pPr algn="ctr"/>
-            <a:endParaRPr b="0" lang="en-US" sz="4400" spc="-1" strike="noStrike">
-              <a:latin typeface="Arial"/>
-            </a:endParaRPr>
-          </a:p>
-        </p:txBody>
-      </p:sp>
-      <p:sp>
-        <p:nvSpPr>
-          <p:cNvPr id="10" name="PlaceHolder 2"/>
-          <p:cNvSpPr>
-            <a:spLocks noGrp="1"/>
-          </p:cNvSpPr>
-          <p:nvPr>
-            <p:ph/>
-          </p:nvPr>
-        </p:nvSpPr>
-        <p:spPr>
-          <a:xfrm>
-            <a:off x="504000" y="1326600"/>
-            <a:ext cx="4426920" cy="1568520"/>
-          </a:xfrm>
-          <a:prstGeom prst="rect">
-            <a:avLst/>
-          </a:prstGeom>
-          <a:noFill/>
-          <a:ln w="0">
-            <a:noFill/>
-          </a:ln>
-        </p:spPr>
-        <p:txBody>
-          <a:bodyPr lIns="0" rIns="0" tIns="0" bIns="0" anchor="t">
-            <a:normAutofit/>
-          </a:bodyPr>
-          <a:p>
-            <a:endParaRPr b="0" lang="en-US" sz="3200" spc="-1" strike="noStrike">
-              <a:latin typeface="Arial"/>
-            </a:endParaRPr>
-          </a:p>
-        </p:txBody>
-      </p:sp>
-      <p:sp>
-        <p:nvSpPr>
-          <p:cNvPr id="11" name="PlaceHolder 3"/>
-          <p:cNvSpPr>
-            <a:spLocks noGrp="1"/>
-          </p:cNvSpPr>
-          <p:nvPr>
-            <p:ph/>
-          </p:nvPr>
-        </p:nvSpPr>
-        <p:spPr>
-          <a:xfrm>
-            <a:off x="5152680" y="1326600"/>
-            <a:ext cx="4426920" cy="3288600"/>
-          </a:xfrm>
-          <a:prstGeom prst="rect">
-            <a:avLst/>
-          </a:prstGeom>
-          <a:noFill/>
-          <a:ln w="0">
-            <a:noFill/>
-          </a:ln>
-        </p:spPr>
-        <p:txBody>
-          <a:bodyPr lIns="0" rIns="0" tIns="0" bIns="0" anchor="t">
-            <a:normAutofit/>
-          </a:bodyPr>
-          <a:p>
-            <a:endParaRPr b="0" lang="en-US" sz="3200" spc="-1" strike="noStrike">
-              <a:latin typeface="Arial"/>
-            </a:endParaRPr>
-          </a:p>
-        </p:txBody>
-      </p:sp>
-      <p:sp>
-        <p:nvSpPr>
-          <p:cNvPr id="12" name="PlaceHolder 4"/>
-          <p:cNvSpPr>
-            <a:spLocks noGrp="1"/>
-          </p:cNvSpPr>
-          <p:nvPr>
-            <p:ph/>
-          </p:nvPr>
-        </p:nvSpPr>
-        <p:spPr>
-          <a:xfrm>
-            <a:off x="504000" y="3044520"/>
-            <a:ext cx="4426920" cy="1568520"/>
-          </a:xfrm>
-          <a:prstGeom prst="rect">
-            <a:avLst/>
-          </a:prstGeom>
-          <a:noFill/>
-          <a:ln w="0">
-            <a:noFill/>
-          </a:ln>
-        </p:spPr>
-        <p:txBody>
-          <a:bodyPr lIns="0" rIns="0" tIns="0" bIns="0" anchor="t">
-            <a:normAutofit/>
-          </a:bodyPr>
-          <a:p>
-            <a:endParaRPr b="0" lang="en-US" sz="3200" spc="-1" strike="noStrike">
-              <a:latin typeface="Arial"/>
-            </a:endParaRPr>
-          </a:p>
-        </p:txBody>
-      </p:sp>
-    </p:spTree>
-  </p:cSld>
-</p:sldLayout>
-</file>
-
-<file path=ppt/slideLayouts/slideLayout8.xml><?xml version="1.0" encoding="utf-8"?>
-<p:sldLayout xmlns:a="http://schemas.openxmlformats.org/drawingml/2006/main" xmlns:p="http://schemas.openxmlformats.org/presentationml/2006/main" xmlns:r="http://schemas.openxmlformats.org/officeDocument/2006/relationships" xmlns:p14="http://schemas.microsoft.com/office/powerpoint/2010/main" xmlns:p15="http://schemas.microsoft.com/office/powerpoint/2012/main" xmlns:mc="http://schemas.openxmlformats.org/markup-compatibility/2006" type="objAndTwoObj" preserve="1">
-  <p:cSld name="Title Content and 2 Content">
-    <p:spTree>
-      <p:nvGrpSpPr>
-        <p:cNvPr id="1" name=""/>
-        <p:cNvGrpSpPr/>
-        <p:nvPr/>
-      </p:nvGrpSpPr>
-      <p:grpSpPr>
-        <a:xfrm>
-          <a:off x="0" y="0"/>
-          <a:ext cx="0" cy="0"/>
-          <a:chOff x="0" y="0"/>
-          <a:chExt cx="0" cy="0"/>
-        </a:xfrm>
-      </p:grpSpPr>
-      <p:sp>
-        <p:nvSpPr>
-          <p:cNvPr id="13" name="PlaceHolder 1"/>
-          <p:cNvSpPr>
-            <a:spLocks noGrp="1"/>
-          </p:cNvSpPr>
-          <p:nvPr>
-            <p:ph type="title"/>
-          </p:nvPr>
-        </p:nvSpPr>
-        <p:spPr>
-          <a:xfrm>
-            <a:off x="504000" y="226080"/>
-            <a:ext cx="9072000" cy="946440"/>
-          </a:xfrm>
-          <a:prstGeom prst="rect">
-            <a:avLst/>
-          </a:prstGeom>
-          <a:noFill/>
-          <a:ln w="0">
-            <a:noFill/>
-          </a:ln>
-        </p:spPr>
-        <p:txBody>
-          <a:bodyPr lIns="0" rIns="0" tIns="0" bIns="0" anchor="ctr">
-            <a:noAutofit/>
-          </a:bodyPr>
-          <a:p>
-            <a:pPr algn="ctr"/>
-            <a:endParaRPr b="0" lang="en-US" sz="4400" spc="-1" strike="noStrike">
-              <a:latin typeface="Arial"/>
-            </a:endParaRPr>
-          </a:p>
-        </p:txBody>
-      </p:sp>
-      <p:sp>
-        <p:nvSpPr>
-          <p:cNvPr id="14" name="PlaceHolder 2"/>
-          <p:cNvSpPr>
-            <a:spLocks noGrp="1"/>
-          </p:cNvSpPr>
-          <p:nvPr>
-            <p:ph/>
-          </p:nvPr>
-        </p:nvSpPr>
-        <p:spPr>
-          <a:xfrm>
-            <a:off x="504000" y="1326600"/>
-            <a:ext cx="4426920" cy="3288600"/>
-          </a:xfrm>
-          <a:prstGeom prst="rect">
-            <a:avLst/>
-          </a:prstGeom>
-          <a:noFill/>
-          <a:ln w="0">
-            <a:noFill/>
-          </a:ln>
-        </p:spPr>
-        <p:txBody>
-          <a:bodyPr lIns="0" rIns="0" tIns="0" bIns="0" anchor="t">
-            <a:normAutofit/>
-          </a:bodyPr>
-          <a:p>
-            <a:endParaRPr b="0" lang="en-US" sz="3200" spc="-1" strike="noStrike">
-              <a:latin typeface="Arial"/>
-            </a:endParaRPr>
-          </a:p>
-        </p:txBody>
-      </p:sp>
-      <p:sp>
-        <p:nvSpPr>
-          <p:cNvPr id="15" name="PlaceHolder 3"/>
-          <p:cNvSpPr>
-            <a:spLocks noGrp="1"/>
-          </p:cNvSpPr>
-          <p:nvPr>
-            <p:ph/>
-          </p:nvPr>
-        </p:nvSpPr>
-        <p:spPr>
-          <a:xfrm>
-            <a:off x="5152680" y="1326600"/>
-            <a:ext cx="4426920" cy="1568520"/>
-          </a:xfrm>
-          <a:prstGeom prst="rect">
-            <a:avLst/>
-          </a:prstGeom>
-          <a:noFill/>
-          <a:ln w="0">
-            <a:noFill/>
-          </a:ln>
-        </p:spPr>
-        <p:txBody>
-          <a:bodyPr lIns="0" rIns="0" tIns="0" bIns="0" anchor="t">
-            <a:normAutofit/>
-          </a:bodyPr>
-          <a:p>
-            <a:endParaRPr b="0" lang="en-US" sz="3200" spc="-1" strike="noStrike">
-              <a:latin typeface="Arial"/>
-            </a:endParaRPr>
-          </a:p>
-        </p:txBody>
-      </p:sp>
-      <p:sp>
-        <p:nvSpPr>
-          <p:cNvPr id="16" name="PlaceHolder 4"/>
-          <p:cNvSpPr>
-            <a:spLocks noGrp="1"/>
-          </p:cNvSpPr>
-          <p:nvPr>
-            <p:ph/>
-          </p:nvPr>
-        </p:nvSpPr>
-        <p:spPr>
-          <a:xfrm>
-            <a:off x="5152680" y="3044520"/>
-            <a:ext cx="4426920" cy="1568520"/>
-          </a:xfrm>
-          <a:prstGeom prst="rect">
-            <a:avLst/>
-          </a:prstGeom>
-          <a:noFill/>
-          <a:ln w="0">
-            <a:noFill/>
-          </a:ln>
-        </p:spPr>
-        <p:txBody>
-          <a:bodyPr lIns="0" rIns="0" tIns="0" bIns="0" anchor="t">
-            <a:normAutofit/>
-          </a:bodyPr>
-          <a:p>
-            <a:endParaRPr b="0" lang="en-US" sz="3200" spc="-1" strike="noStrike">
-              <a:latin typeface="Arial"/>
-            </a:endParaRPr>
-          </a:p>
-        </p:txBody>
-      </p:sp>
-    </p:spTree>
-  </p:cSld>
-</p:sldLayout>
-</file>
-
-<file path=ppt/slideLayouts/slideLayout9.xml><?xml version="1.0" encoding="utf-8"?>
-<p:sldLayout xmlns:a="http://schemas.openxmlformats.org/drawingml/2006/main" xmlns:p="http://schemas.openxmlformats.org/presentationml/2006/main" xmlns:r="http://schemas.openxmlformats.org/officeDocument/2006/relationships" xmlns:p14="http://schemas.microsoft.com/office/powerpoint/2010/main" xmlns:p15="http://schemas.microsoft.com/office/powerpoint/2012/main" xmlns:mc="http://schemas.openxmlformats.org/markup-compatibility/2006" type="twoObjOverTx" preserve="1">
-  <p:cSld name="Title, 2 Content over Content">
-    <p:spTree>
-      <p:nvGrpSpPr>
-        <p:cNvPr id="1" name=""/>
-        <p:cNvGrpSpPr/>
-        <p:nvPr/>
-      </p:nvGrpSpPr>
-      <p:grpSpPr>
-        <a:xfrm>
-          <a:off x="0" y="0"/>
-          <a:ext cx="0" cy="0"/>
-          <a:chOff x="0" y="0"/>
-          <a:chExt cx="0" cy="0"/>
-        </a:xfrm>
-      </p:grpSpPr>
-      <p:sp>
-        <p:nvSpPr>
-          <p:cNvPr id="17" name="PlaceHolder 1"/>
-          <p:cNvSpPr>
-            <a:spLocks noGrp="1"/>
-          </p:cNvSpPr>
-          <p:nvPr>
-            <p:ph type="title"/>
-          </p:nvPr>
-        </p:nvSpPr>
-        <p:spPr>
-          <a:xfrm>
-            <a:off x="504000" y="226080"/>
-            <a:ext cx="9072000" cy="946440"/>
-          </a:xfrm>
-          <a:prstGeom prst="rect">
-            <a:avLst/>
-          </a:prstGeom>
-          <a:noFill/>
-          <a:ln w="0">
-            <a:noFill/>
-          </a:ln>
-        </p:spPr>
-        <p:txBody>
-          <a:bodyPr lIns="0" rIns="0" tIns="0" bIns="0" anchor="ctr">
-            <a:noAutofit/>
-          </a:bodyPr>
-          <a:p>
-            <a:pPr algn="ctr"/>
-            <a:endParaRPr b="0" lang="en-US" sz="4400" spc="-1" strike="noStrike">
-              <a:latin typeface="Arial"/>
-            </a:endParaRPr>
-          </a:p>
-        </p:txBody>
-      </p:sp>
-      <p:sp>
-        <p:nvSpPr>
-          <p:cNvPr id="18" name="PlaceHolder 2"/>
-          <p:cNvSpPr>
-            <a:spLocks noGrp="1"/>
-          </p:cNvSpPr>
-          <p:nvPr>
-            <p:ph/>
-          </p:nvPr>
-        </p:nvSpPr>
-        <p:spPr>
-          <a:xfrm>
-            <a:off x="504000" y="1326600"/>
-            <a:ext cx="4426920" cy="1568520"/>
-          </a:xfrm>
-          <a:prstGeom prst="rect">
-            <a:avLst/>
-          </a:prstGeom>
-          <a:noFill/>
-          <a:ln w="0">
-            <a:noFill/>
-          </a:ln>
-        </p:spPr>
-        <p:txBody>
-          <a:bodyPr lIns="0" rIns="0" tIns="0" bIns="0" anchor="t">
-            <a:normAutofit/>
-          </a:bodyPr>
-          <a:p>
-            <a:endParaRPr b="0" lang="en-US" sz="3200" spc="-1" strike="noStrike">
-              <a:latin typeface="Arial"/>
-            </a:endParaRPr>
-          </a:p>
-        </p:txBody>
-      </p:sp>
-      <p:sp>
-        <p:nvSpPr>
-          <p:cNvPr id="19" name="PlaceHolder 3"/>
-          <p:cNvSpPr>
-            <a:spLocks noGrp="1"/>
-          </p:cNvSpPr>
-          <p:nvPr>
-            <p:ph/>
-          </p:nvPr>
-        </p:nvSpPr>
-        <p:spPr>
-          <a:xfrm>
-            <a:off x="5152680" y="1326600"/>
-            <a:ext cx="4426920" cy="1568520"/>
-          </a:xfrm>
-          <a:prstGeom prst="rect">
-            <a:avLst/>
-          </a:prstGeom>
-          <a:noFill/>
-          <a:ln w="0">
-            <a:noFill/>
-          </a:ln>
-        </p:spPr>
-        <p:txBody>
-          <a:bodyPr lIns="0" rIns="0" tIns="0" bIns="0" anchor="t">
-            <a:normAutofit/>
-          </a:bodyPr>
-          <a:p>
-            <a:endParaRPr b="0" lang="en-US" sz="3200" spc="-1" strike="noStrike">
-              <a:latin typeface="Arial"/>
-            </a:endParaRPr>
-          </a:p>
-        </p:txBody>
-      </p:sp>
-      <p:sp>
-        <p:nvSpPr>
-          <p:cNvPr id="20" name="PlaceHolder 4"/>
-          <p:cNvSpPr>
-            <a:spLocks noGrp="1"/>
-          </p:cNvSpPr>
-          <p:nvPr>
-            <p:ph/>
-          </p:nvPr>
-        </p:nvSpPr>
-        <p:spPr>
-          <a:xfrm>
-            <a:off x="504000" y="3044520"/>
-            <a:ext cx="9072000" cy="1568520"/>
-          </a:xfrm>
-          <a:prstGeom prst="rect">
-            <a:avLst/>
-          </a:prstGeom>
-          <a:noFill/>
-          <a:ln w="0">
-            <a:noFill/>
-          </a:ln>
-        </p:spPr>
-        <p:txBody>
-          <a:bodyPr lIns="0" rIns="0" tIns="0" bIns="0" anchor="t">
-            <a:normAutofit/>
-          </a:bodyPr>
-          <a:p>
-            <a:endParaRPr b="0" lang="en-US" sz="3200" spc="-1" strike="noStrike">
-              <a:latin typeface="Arial"/>
-            </a:endParaRPr>
-          </a:p>
-        </p:txBody>
-      </p:sp>
-    </p:spTree>
-  </p:cSld>
-</p:sldLayout>
-</file>
-
-<file path=ppt/slideMasters/slideMaster1.xml><?xml version="1.0" encoding="utf-8"?>
-<p:sldMaster xmlns:a="http://schemas.openxmlformats.org/drawingml/2006/main" xmlns:p="http://schemas.openxmlformats.org/presentationml/2006/main" xmlns:r="http://schemas.openxmlformats.org/officeDocument/2006/relationships" xmlns:p14="http://schemas.microsoft.com/office/powerpoint/2010/main" xmlns:p15="http://schemas.microsoft.com/office/powerpoint/2012/main" xmlns:mc="http://schemas.openxmlformats.org/markup-compatibility/2006">
-  <p:cSld>
-    <p:spTree>
-      <p:nvGrpSpPr>
-        <p:cNvPr id="1" name=""/>
-        <p:cNvGrpSpPr/>
-        <p:nvPr/>
-      </p:nvGrpSpPr>
-      <p:grpSpPr>
-        <a:xfrm>
-          <a:off x="0" y="0"/>
-          <a:ext cx="0" cy="0"/>
-          <a:chOff x="0" y="0"/>
-          <a:chExt cx="0" cy="0"/>
-        </a:xfrm>
-      </p:grpSpPr>
     </p:spTree>
   </p:cSld>
   <p:clrMap bg1="lt1" bg2="lt2" tx1="dk1" tx2="dk2" accent1="accent1" accent2="accent2" accent3="accent3" accent4="accent4" accent5="accent5" accent6="accent6" hlink="hlink" folHlink="folHlink"/>
@@ -1816,7 +2040,7 @@
       </p:grpSpPr>
       <p:sp>
         <p:nvSpPr>
-          <p:cNvPr id="36" name="PlaceHolder 1"/>
+          <p:cNvPr id="38" name="PlaceHolder 1"/>
           <p:cNvSpPr>
             <a:spLocks noGrp="1"/>
           </p:cNvSpPr>
@@ -1826,8 +2050,8 @@
         </p:nvSpPr>
         <p:spPr>
           <a:xfrm>
-            <a:off x="504000" y="226080"/>
-            <a:ext cx="9070560" cy="945360"/>
+            <a:off x="457200" y="0"/>
+            <a:ext cx="9070200" cy="945000"/>
           </a:xfrm>
           <a:prstGeom prst="rect">
             <a:avLst/>
@@ -1861,26 +2085,26 @@
       </p:sp>
       <p:graphicFrame>
         <p:nvGraphicFramePr>
-          <p:cNvPr id="37" name=""/>
+          <p:cNvPr id="39" name=""/>
           <p:cNvGraphicFramePr/>
           <p:nvPr/>
         </p:nvGraphicFramePr>
         <p:xfrm>
-          <a:off x="4540680" y="1414080"/>
-          <a:ext cx="5208120" cy="2784600"/>
+          <a:off x="4457160" y="1120320"/>
+          <a:ext cx="5208120" cy="2084760"/>
         </p:xfrm>
         <a:graphic>
           <a:graphicData uri="http://schemas.openxmlformats.org/drawingml/2006/table">
             <a:tbl>
               <a:tblPr/>
               <a:tblGrid>
-                <a:gridCol w="272880"/>
-                <a:gridCol w="730080"/>
-                <a:gridCol w="1600560"/>
+                <a:gridCol w="216000"/>
+                <a:gridCol w="813600"/>
+                <a:gridCol w="1573920"/>
                 <a:gridCol w="1301760"/>
                 <a:gridCol w="1303200"/>
               </a:tblGrid>
-              <a:tr h="331200">
+              <a:tr h="326520">
                 <a:tc gridSpan="3">
                   <a:txBody>
                     <a:bodyPr lIns="90000" rIns="90000" anchor="t">
@@ -2040,7 +2264,7 @@
                   </a:tcPr>
                 </a:tc>
               </a:tr>
-              <a:tr h="354240">
+              <a:tr h="433080">
                 <a:tc gridSpan="2">
                   <a:txBody>
                     <a:bodyPr lIns="90000" rIns="90000" anchor="t">
@@ -2241,7 +2465,7 @@
                   </a:tcPr>
                 </a:tc>
               </a:tr>
-              <a:tr h="349920">
+              <a:tr h="433080">
                 <a:tc gridSpan="2">
                   <a:txBody>
                     <a:bodyPr lIns="90000" rIns="90000" anchor="t">
@@ -2442,7 +2666,7 @@
                   </a:tcPr>
                 </a:tc>
               </a:tr>
-              <a:tr h="349920">
+              <a:tr h="433080">
                 <a:tc>
                   <a:txBody>
                     <a:bodyPr lIns="90000" rIns="90000" anchor="t">
@@ -2664,7 +2888,7 @@
                   </a:tcPr>
                 </a:tc>
               </a:tr>
-              <a:tr h="349920">
+              <a:tr h="433080">
                 <a:tc>
                   <a:txBody>
                     <a:bodyPr lIns="90000" rIns="90000" anchor="t">
@@ -2886,7 +3110,7 @@
                   </a:tcPr>
                 </a:tc>
               </a:tr>
-              <a:tr h="349920">
+              <a:tr h="433080">
                 <a:tc gridSpan="2">
                   <a:txBody>
                     <a:bodyPr lIns="90000" rIns="90000" anchor="t">
@@ -3087,19 +3311,381 @@
                   </a:tcPr>
                 </a:tc>
               </a:tr>
+              <a:tr h="433080">
+                <a:tc gridSpan="2">
+                  <a:txBody>
+                    <a:bodyPr lIns="90000" rIns="90000" anchor="t">
+                      <a:noAutofit/>
+                    </a:bodyPr>
+                    <a:p>
+                      <a:r>
+                        <a:rPr b="0" lang="en-US" sz="1200" spc="-1" strike="noStrike">
+                          <a:latin typeface="Arial"/>
+                        </a:rPr>
+                        <a:t>q</a:t>
+                      </a:r>
+                      <a:endParaRPr b="0" lang="en-US" sz="1200" spc="-1" strike="noStrike">
+                        <a:latin typeface="Arial"/>
+                      </a:endParaRPr>
+                    </a:p>
+                  </a:txBody>
+                  <a:tcPr anchor="t" marL="90000" marR="90000">
+                    <a:lnL w="720">
+                      <a:solidFill>
+                        <a:srgbClr val="ffffff"/>
+                      </a:solidFill>
+                    </a:lnL>
+                    <a:lnR w="720">
+                      <a:solidFill>
+                        <a:srgbClr val="ffffff"/>
+                      </a:solidFill>
+                    </a:lnR>
+                    <a:lnT w="720">
+                      <a:solidFill>
+                        <a:srgbClr val="ffffff"/>
+                      </a:solidFill>
+                    </a:lnT>
+                    <a:lnB w="720">
+                      <a:solidFill>
+                        <a:srgbClr val="ffffff"/>
+                      </a:solidFill>
+                    </a:lnB>
+                    <a:solidFill>
+                      <a:srgbClr val="e6e6e6"/>
+                    </a:solidFill>
+                  </a:tcPr>
+                </a:tc>
+                <a:tc hMerge="1">
+                  <a:tcPr anchor="t" marL="90000" marR="90000">
+                    <a:solidFill>
+                      <a:srgbClr val="729fcf"/>
+                    </a:solidFill>
+                  </a:tcPr>
+                </a:tc>
+                <a:tc>
+                  <a:txBody>
+                    <a:bodyPr lIns="90000" rIns="90000" anchor="t">
+                      <a:noAutofit/>
+                    </a:bodyPr>
+                    <a:p>
+                      <a:r>
+                        <a:rPr b="0" lang="en-US" sz="1200" spc="-1" strike="noStrike">
+                          <a:latin typeface="Arial"/>
+                        </a:rPr>
+                        <a:t>Mezzi.T.F. / Patr.N.</a:t>
+                      </a:r>
+                      <a:endParaRPr b="0" lang="en-US" sz="1200" spc="-1" strike="noStrike">
+                        <a:latin typeface="Arial"/>
+                      </a:endParaRPr>
+                    </a:p>
+                  </a:txBody>
+                  <a:tcPr anchor="t" marL="90000" marR="90000">
+                    <a:lnL w="720">
+                      <a:solidFill>
+                        <a:srgbClr val="ffffff"/>
+                      </a:solidFill>
+                    </a:lnL>
+                    <a:lnR w="720">
+                      <a:solidFill>
+                        <a:srgbClr val="ffffff"/>
+                      </a:solidFill>
+                    </a:lnR>
+                    <a:lnT w="720">
+                      <a:solidFill>
+                        <a:srgbClr val="ffffff"/>
+                      </a:solidFill>
+                    </a:lnT>
+                    <a:lnB w="720">
+                      <a:solidFill>
+                        <a:srgbClr val="ffffff"/>
+                      </a:solidFill>
+                    </a:lnB>
+                    <a:solidFill>
+                      <a:srgbClr val="e6e6e6"/>
+                    </a:solidFill>
+                  </a:tcPr>
+                </a:tc>
+                <a:tc>
+                  <a:txBody>
+                    <a:bodyPr lIns="90000" rIns="90000" anchor="t">
+                      <a:noAutofit/>
+                    </a:bodyPr>
+                    <a:p>
+                      <a:r>
+                        <a:rPr b="0" lang="en-US" sz="1200" spc="-1" strike="noStrike">
+                          <a:latin typeface="Arial"/>
+                        </a:rPr>
+                        <a:t>0.98</a:t>
+                      </a:r>
+                      <a:endParaRPr b="0" lang="en-US" sz="1200" spc="-1" strike="noStrike">
+                        <a:latin typeface="Arial"/>
+                      </a:endParaRPr>
+                    </a:p>
+                  </a:txBody>
+                  <a:tcPr anchor="t" marL="90000" marR="90000">
+                    <a:lnL w="720">
+                      <a:solidFill>
+                        <a:srgbClr val="ffffff"/>
+                      </a:solidFill>
+                    </a:lnL>
+                    <a:lnR w="720">
+                      <a:solidFill>
+                        <a:srgbClr val="ffffff"/>
+                      </a:solidFill>
+                    </a:lnR>
+                    <a:lnT w="720">
+                      <a:solidFill>
+                        <a:srgbClr val="ffffff"/>
+                      </a:solidFill>
+                    </a:lnT>
+                    <a:lnB w="720">
+                      <a:solidFill>
+                        <a:srgbClr val="ffffff"/>
+                      </a:solidFill>
+                    </a:lnB>
+                    <a:solidFill>
+                      <a:srgbClr val="e6e6e6"/>
+                    </a:solidFill>
+                  </a:tcPr>
+                </a:tc>
+                <a:tc>
+                  <a:txBody>
+                    <a:bodyPr lIns="90000" rIns="90000" anchor="t">
+                      <a:noAutofit/>
+                    </a:bodyPr>
+                    <a:p>
+                      <a:r>
+                        <a:rPr b="0" lang="en-US" sz="1200" spc="-1" strike="noStrike">
+                          <a:latin typeface="Arial"/>
+                        </a:rPr>
+                        <a:t>0.83</a:t>
+                      </a:r>
+                      <a:endParaRPr b="0" lang="en-US" sz="1200" spc="-1" strike="noStrike">
+                        <a:latin typeface="Arial"/>
+                      </a:endParaRPr>
+                    </a:p>
+                  </a:txBody>
+                  <a:tcPr anchor="t" marL="90000" marR="90000">
+                    <a:lnL w="720">
+                      <a:solidFill>
+                        <a:srgbClr val="ffffff"/>
+                      </a:solidFill>
+                    </a:lnL>
+                    <a:lnR w="720">
+                      <a:solidFill>
+                        <a:srgbClr val="ffffff"/>
+                      </a:solidFill>
+                    </a:lnR>
+                    <a:lnT w="720">
+                      <a:solidFill>
+                        <a:srgbClr val="ffffff"/>
+                      </a:solidFill>
+                    </a:lnT>
+                    <a:lnB w="720">
+                      <a:solidFill>
+                        <a:srgbClr val="ffffff"/>
+                      </a:solidFill>
+                    </a:lnB>
+                    <a:solidFill>
+                      <a:srgbClr val="e6e6e6"/>
+                    </a:solidFill>
+                  </a:tcPr>
+                </a:tc>
+              </a:tr>
+              <a:tr h="433080">
+                <a:tc gridSpan="2">
+                  <a:txBody>
+                    <a:bodyPr lIns="90000" rIns="90000" anchor="t">
+                      <a:noAutofit/>
+                    </a:bodyPr>
+                    <a:p>
+                      <a:r>
+                        <a:rPr b="0" lang="en-US" sz="1200" spc="-1" strike="noStrike">
+                          <a:latin typeface="Arial"/>
+                        </a:rPr>
+                        <a:t>S</a:t>
+                      </a:r>
+                      <a:endParaRPr b="0" lang="en-US" sz="1200" spc="-1" strike="noStrike">
+                        <a:latin typeface="Arial"/>
+                      </a:endParaRPr>
+                    </a:p>
+                  </a:txBody>
+                  <a:tcPr anchor="t" marL="90000" marR="90000">
+                    <a:lnL w="720">
+                      <a:solidFill>
+                        <a:srgbClr val="ffffff"/>
+                      </a:solidFill>
+                    </a:lnL>
+                    <a:lnR w="720">
+                      <a:solidFill>
+                        <a:srgbClr val="ffffff"/>
+                      </a:solidFill>
+                    </a:lnR>
+                    <a:lnT w="720">
+                      <a:solidFill>
+                        <a:srgbClr val="ffffff"/>
+                      </a:solidFill>
+                    </a:lnT>
+                    <a:lnB w="720">
+                      <a:solidFill>
+                        <a:srgbClr val="ffffff"/>
+                      </a:solidFill>
+                    </a:lnB>
+                    <a:solidFill>
+                      <a:srgbClr val="e6e6e6"/>
+                    </a:solidFill>
+                  </a:tcPr>
+                </a:tc>
+                <a:tc hMerge="1">
+                  <a:tcPr anchor="t" marL="90000" marR="90000">
+                    <a:solidFill>
+                      <a:srgbClr val="729fcf"/>
+                    </a:solidFill>
+                  </a:tcPr>
+                </a:tc>
+                <a:tc>
+                  <a:txBody>
+                    <a:bodyPr lIns="90000" rIns="90000" anchor="t">
+                      <a:noAutofit/>
+                    </a:bodyPr>
+                    <a:p>
+                      <a:r>
+                        <a:rPr b="0" lang="en-US" sz="1200" spc="-1" strike="noStrike">
+                          <a:latin typeface="Arial"/>
+                        </a:rPr>
+                        <a:t>Redd.N / (Redd.N+Imp.+Str.)</a:t>
+                      </a:r>
+                      <a:endParaRPr b="0" lang="en-US" sz="1200" spc="-1" strike="noStrike">
+                        <a:latin typeface="Arial"/>
+                      </a:endParaRPr>
+                    </a:p>
+                  </a:txBody>
+                  <a:tcPr anchor="t" marL="90000" marR="90000">
+                    <a:lnL w="720">
+                      <a:solidFill>
+                        <a:srgbClr val="ffffff"/>
+                      </a:solidFill>
+                    </a:lnL>
+                    <a:lnR w="720">
+                      <a:solidFill>
+                        <a:srgbClr val="ffffff"/>
+                      </a:solidFill>
+                    </a:lnR>
+                    <a:lnT w="720">
+                      <a:solidFill>
+                        <a:srgbClr val="ffffff"/>
+                      </a:solidFill>
+                    </a:lnT>
+                    <a:lnB w="720">
+                      <a:solidFill>
+                        <a:srgbClr val="ffffff"/>
+                      </a:solidFill>
+                    </a:lnB>
+                    <a:solidFill>
+                      <a:srgbClr val="e6e6e6"/>
+                    </a:solidFill>
+                  </a:tcPr>
+                </a:tc>
+                <a:tc>
+                  <a:txBody>
+                    <a:bodyPr lIns="90000" rIns="90000" anchor="t">
+                      <a:noAutofit/>
+                    </a:bodyPr>
+                    <a:p>
+                      <a:r>
+                        <a:rPr b="0" lang="en-US" sz="1200" spc="-1" strike="noStrike">
+                          <a:latin typeface="Arial"/>
+                        </a:rPr>
+                        <a:t>1.29</a:t>
+                      </a:r>
+                      <a:endParaRPr b="0" lang="en-US" sz="1200" spc="-1" strike="noStrike">
+                        <a:latin typeface="Arial"/>
+                      </a:endParaRPr>
+                    </a:p>
+                  </a:txBody>
+                  <a:tcPr anchor="t" marL="90000" marR="90000">
+                    <a:lnL w="720">
+                      <a:solidFill>
+                        <a:srgbClr val="ffffff"/>
+                      </a:solidFill>
+                    </a:lnL>
+                    <a:lnR w="720">
+                      <a:solidFill>
+                        <a:srgbClr val="ffffff"/>
+                      </a:solidFill>
+                    </a:lnR>
+                    <a:lnT w="720">
+                      <a:solidFill>
+                        <a:srgbClr val="ffffff"/>
+                      </a:solidFill>
+                    </a:lnT>
+                    <a:lnB w="720">
+                      <a:solidFill>
+                        <a:srgbClr val="ffffff"/>
+                      </a:solidFill>
+                    </a:lnB>
+                    <a:solidFill>
+                      <a:srgbClr val="e6e6e6"/>
+                    </a:solidFill>
+                  </a:tcPr>
+                </a:tc>
+                <a:tc>
+                  <a:txBody>
+                    <a:bodyPr lIns="90000" rIns="90000" anchor="t">
+                      <a:noAutofit/>
+                    </a:bodyPr>
+                    <a:p>
+                      <a:r>
+                        <a:rPr b="0" lang="en-US" sz="1200" spc="-1" strike="noStrike">
+                          <a:latin typeface="Arial"/>
+                        </a:rPr>
+                        <a:t>1.21</a:t>
+                      </a:r>
+                      <a:endParaRPr b="0" lang="en-US" sz="1200" spc="-1" strike="noStrike">
+                        <a:latin typeface="Arial"/>
+                      </a:endParaRPr>
+                    </a:p>
+                  </a:txBody>
+                  <a:tcPr anchor="t" marL="90000" marR="90000">
+                    <a:lnL w="720">
+                      <a:solidFill>
+                        <a:srgbClr val="ffffff"/>
+                      </a:solidFill>
+                    </a:lnL>
+                    <a:lnR w="720">
+                      <a:solidFill>
+                        <a:srgbClr val="ffffff"/>
+                      </a:solidFill>
+                    </a:lnR>
+                    <a:lnT w="720">
+                      <a:solidFill>
+                        <a:srgbClr val="ffffff"/>
+                      </a:solidFill>
+                    </a:lnT>
+                    <a:lnB w="720">
+                      <a:solidFill>
+                        <a:srgbClr val="ffffff"/>
+                      </a:solidFill>
+                    </a:lnB>
+                    <a:solidFill>
+                      <a:srgbClr val="e6e6e6"/>
+                    </a:solidFill>
+                  </a:tcPr>
+                </a:tc>
+              </a:tr>
             </a:tbl>
           </a:graphicData>
         </a:graphic>
       </p:graphicFrame>
       <p:graphicFrame>
         <p:nvGraphicFramePr>
-          <p:cNvPr id="38" name=""/>
+          <p:cNvPr id="40" name=""/>
           <p:cNvGraphicFramePr/>
           <p:nvPr/>
         </p:nvGraphicFramePr>
         <p:xfrm>
-          <a:off x="266760" y="1172160"/>
-          <a:ext cx="4761720" cy="3250440"/>
+          <a:off x="266760" y="864720"/>
+          <a:ext cx="4761360" cy="3250080"/>
         </p:xfrm>
         <a:graphic>
           <a:graphicData uri="http://schemas.openxmlformats.org/drawingml/2006/chart">
@@ -3109,14 +3695,14 @@
       </p:graphicFrame>
       <p:sp>
         <p:nvSpPr>
-          <p:cNvPr id="39" name=""/>
+          <p:cNvPr id="41" name=""/>
           <p:cNvSpPr/>
           <p:nvPr/>
         </p:nvSpPr>
         <p:spPr>
           <a:xfrm>
-            <a:off x="685800" y="3657600"/>
-            <a:ext cx="826200" cy="345600"/>
+            <a:off x="685800" y="3429000"/>
+            <a:ext cx="825840" cy="345240"/>
           </a:xfrm>
           <a:prstGeom prst="rect">
             <a:avLst/>
@@ -3160,14 +3746,14 @@
       </p:sp>
       <p:sp>
         <p:nvSpPr>
-          <p:cNvPr id="40" name=""/>
+          <p:cNvPr id="42" name=""/>
           <p:cNvSpPr/>
           <p:nvPr/>
         </p:nvSpPr>
         <p:spPr>
           <a:xfrm>
-            <a:off x="1828800" y="2854080"/>
-            <a:ext cx="913680" cy="345600"/>
+            <a:off x="1829880" y="2514600"/>
+            <a:ext cx="913320" cy="345240"/>
           </a:xfrm>
           <a:prstGeom prst="rect">
             <a:avLst/>
@@ -3211,14 +3797,14 @@
       </p:sp>
       <p:sp>
         <p:nvSpPr>
-          <p:cNvPr id="41" name=""/>
+          <p:cNvPr id="43" name=""/>
           <p:cNvSpPr/>
           <p:nvPr/>
         </p:nvSpPr>
         <p:spPr>
           <a:xfrm>
-            <a:off x="2971800" y="2514600"/>
-            <a:ext cx="913680" cy="345600"/>
+            <a:off x="2971800" y="2169360"/>
+            <a:ext cx="913320" cy="345240"/>
           </a:xfrm>
           <a:prstGeom prst="rect">
             <a:avLst/>
@@ -3262,14 +3848,14 @@
       </p:sp>
       <p:sp>
         <p:nvSpPr>
-          <p:cNvPr id="42" name=""/>
+          <p:cNvPr id="44" name=""/>
           <p:cNvSpPr/>
           <p:nvPr/>
         </p:nvSpPr>
         <p:spPr>
           <a:xfrm>
-            <a:off x="4572000" y="3686760"/>
-            <a:ext cx="3886200" cy="1342440"/>
+            <a:off x="228600" y="4144320"/>
+            <a:ext cx="3885840" cy="1342080"/>
           </a:xfrm>
           <a:prstGeom prst="rect">
             <a:avLst/>
@@ -3297,7 +3883,11 @@
             </a:pPr>
             <a:r>
               <a:rPr b="0" lang="en-US" sz="1400" spc="-1" strike="noStrike">
+                <a:solidFill>
+                  <a:srgbClr val="000000"/>
+                </a:solidFill>
                 <a:latin typeface="Arial"/>
+                <a:ea typeface="DejaVu Sans"/>
               </a:rPr>
               <a:t>Il ROE molto negativo indica un’erosione del </a:t>
             </a:r>
@@ -3313,7 +3903,11 @@
             </a:pPr>
             <a:r>
               <a:rPr b="0" lang="en-US" sz="1400" spc="-1" strike="noStrike">
+                <a:solidFill>
+                  <a:srgbClr val="000000"/>
+                </a:solidFill>
                 <a:latin typeface="Arial"/>
+                <a:ea typeface="DejaVu Sans"/>
               </a:rPr>
               <a:t>capitale netto dovuta alle perdite.</a:t>
             </a:r>
@@ -3339,7 +3933,11 @@
             </a:pPr>
             <a:r>
               <a:rPr b="0" lang="en-US" sz="1400" spc="-1" strike="noStrike">
+                <a:solidFill>
+                  <a:srgbClr val="000000"/>
+                </a:solidFill>
                 <a:latin typeface="Arial"/>
+                <a:ea typeface="DejaVu Sans"/>
               </a:rPr>
               <a:t>La relazione ROI &gt; ROD indica che per </a:t>
             </a:r>
@@ -3355,7 +3953,11 @@
             </a:pPr>
             <a:r>
               <a:rPr b="0" lang="en-US" sz="1400" spc="-1" strike="noStrike">
+                <a:solidFill>
+                  <a:srgbClr val="000000"/>
+                </a:solidFill>
                 <a:latin typeface="Arial"/>
+                <a:ea typeface="DejaVu Sans"/>
               </a:rPr>
               <a:t>l’impresa non e’ conveniente ricorrere a </a:t>
             </a:r>
@@ -3371,7 +3973,11 @@
             </a:pPr>
             <a:r>
               <a:rPr b="0" lang="en-US" sz="1400" spc="-1" strike="noStrike">
+                <a:solidFill>
+                  <a:srgbClr val="000000"/>
+                </a:solidFill>
                 <a:latin typeface="Arial"/>
+                <a:ea typeface="DejaVu Sans"/>
               </a:rPr>
               <a:t>mezzi di terzi finanziari.</a:t>
             </a:r>

</xml_diff>